<commit_message>
synchronous  motor files are added.
</commit_message>
<xml_diff>
--- a/Synhronous motor/TPEL-Journal-version-2/Experiment/New Microsoft PowerPoint Presentation.pptx
+++ b/Synhronous motor/TPEL-Journal-version-2/Experiment/New Microsoft PowerPoint Presentation.pptx
@@ -7,6 +7,7 @@
   <p:sldIdLst>
     <p:sldId id="256" r:id="rId2"/>
     <p:sldId id="257" r:id="rId3"/>
+    <p:sldId id="258" r:id="rId4"/>
   </p:sldIdLst>
   <p:sldSz cx="12192000" cy="6858000"/>
   <p:notesSz cx="6858000" cy="9144000"/>
@@ -105,6 +106,11 @@
       </a:defRPr>
     </a:lvl9pPr>
   </p:defaultTextStyle>
+  <p:extLst>
+    <p:ext uri="{EFAFB233-063F-42B5-8137-9DF3F51BA10A}">
+      <p15:sldGuideLst xmlns:p15="http://schemas.microsoft.com/office/powerpoint/2012/main"/>
+    </p:ext>
+  </p:extLst>
 </p:presentation>
 </file>
 
@@ -255,7 +261,7 @@
           <a:p>
             <a:fld id="{F35F0F5D-E3EF-4328-BF39-3FA8E690808D}" type="datetimeFigureOut">
               <a:rPr lang="en-US" smtClean="0"/>
-              <a:t>11/2/2022</a:t>
+              <a:t>2/8/2023</a:t>
             </a:fld>
             <a:endParaRPr lang="en-US"/>
           </a:p>
@@ -453,7 +459,7 @@
           <a:p>
             <a:fld id="{F35F0F5D-E3EF-4328-BF39-3FA8E690808D}" type="datetimeFigureOut">
               <a:rPr lang="en-US" smtClean="0"/>
-              <a:t>11/2/2022</a:t>
+              <a:t>2/8/2023</a:t>
             </a:fld>
             <a:endParaRPr lang="en-US"/>
           </a:p>
@@ -661,7 +667,7 @@
           <a:p>
             <a:fld id="{F35F0F5D-E3EF-4328-BF39-3FA8E690808D}" type="datetimeFigureOut">
               <a:rPr lang="en-US" smtClean="0"/>
-              <a:t>11/2/2022</a:t>
+              <a:t>2/8/2023</a:t>
             </a:fld>
             <a:endParaRPr lang="en-US"/>
           </a:p>
@@ -859,7 +865,7 @@
           <a:p>
             <a:fld id="{F35F0F5D-E3EF-4328-BF39-3FA8E690808D}" type="datetimeFigureOut">
               <a:rPr lang="en-US" smtClean="0"/>
-              <a:t>11/2/2022</a:t>
+              <a:t>2/8/2023</a:t>
             </a:fld>
             <a:endParaRPr lang="en-US"/>
           </a:p>
@@ -1134,7 +1140,7 @@
           <a:p>
             <a:fld id="{F35F0F5D-E3EF-4328-BF39-3FA8E690808D}" type="datetimeFigureOut">
               <a:rPr lang="en-US" smtClean="0"/>
-              <a:t>11/2/2022</a:t>
+              <a:t>2/8/2023</a:t>
             </a:fld>
             <a:endParaRPr lang="en-US"/>
           </a:p>
@@ -1399,7 +1405,7 @@
           <a:p>
             <a:fld id="{F35F0F5D-E3EF-4328-BF39-3FA8E690808D}" type="datetimeFigureOut">
               <a:rPr lang="en-US" smtClean="0"/>
-              <a:t>11/2/2022</a:t>
+              <a:t>2/8/2023</a:t>
             </a:fld>
             <a:endParaRPr lang="en-US"/>
           </a:p>
@@ -1811,7 +1817,7 @@
           <a:p>
             <a:fld id="{F35F0F5D-E3EF-4328-BF39-3FA8E690808D}" type="datetimeFigureOut">
               <a:rPr lang="en-US" smtClean="0"/>
-              <a:t>11/2/2022</a:t>
+              <a:t>2/8/2023</a:t>
             </a:fld>
             <a:endParaRPr lang="en-US"/>
           </a:p>
@@ -1952,7 +1958,7 @@
           <a:p>
             <a:fld id="{F35F0F5D-E3EF-4328-BF39-3FA8E690808D}" type="datetimeFigureOut">
               <a:rPr lang="en-US" smtClean="0"/>
-              <a:t>11/2/2022</a:t>
+              <a:t>2/8/2023</a:t>
             </a:fld>
             <a:endParaRPr lang="en-US"/>
           </a:p>
@@ -2065,7 +2071,7 @@
           <a:p>
             <a:fld id="{F35F0F5D-E3EF-4328-BF39-3FA8E690808D}" type="datetimeFigureOut">
               <a:rPr lang="en-US" smtClean="0"/>
-              <a:t>11/2/2022</a:t>
+              <a:t>2/8/2023</a:t>
             </a:fld>
             <a:endParaRPr lang="en-US"/>
           </a:p>
@@ -2376,7 +2382,7 @@
           <a:p>
             <a:fld id="{F35F0F5D-E3EF-4328-BF39-3FA8E690808D}" type="datetimeFigureOut">
               <a:rPr lang="en-US" smtClean="0"/>
-              <a:t>11/2/2022</a:t>
+              <a:t>2/8/2023</a:t>
             </a:fld>
             <a:endParaRPr lang="en-US"/>
           </a:p>
@@ -2664,7 +2670,7 @@
           <a:p>
             <a:fld id="{F35F0F5D-E3EF-4328-BF39-3FA8E690808D}" type="datetimeFigureOut">
               <a:rPr lang="en-US" smtClean="0"/>
-              <a:t>11/2/2022</a:t>
+              <a:t>2/8/2023</a:t>
             </a:fld>
             <a:endParaRPr lang="en-US"/>
           </a:p>
@@ -2905,7 +2911,7 @@
           <a:p>
             <a:fld id="{F35F0F5D-E3EF-4328-BF39-3FA8E690808D}" type="datetimeFigureOut">
               <a:rPr lang="en-US" smtClean="0"/>
-              <a:t>11/2/2022</a:t>
+              <a:t>2/8/2023</a:t>
             </a:fld>
             <a:endParaRPr lang="en-US"/>
           </a:p>
@@ -3888,8 +3894,8 @@
           </a:fontRef>
         </p:style>
       </p:cxnSp>
-      <mc:AlternateContent xmlns:mc="http://schemas.openxmlformats.org/markup-compatibility/2006">
-        <mc:Choice xmlns:a14="http://schemas.microsoft.com/office/drawing/2010/main" Requires="a14">
+      <mc:AlternateContent xmlns:mc="http://schemas.openxmlformats.org/markup-compatibility/2006" xmlns:a14="http://schemas.microsoft.com/office/drawing/2010/main">
+        <mc:Choice Requires="a14">
           <p:sp>
             <p:nvSpPr>
               <p:cNvPr id="22" name="TextBox 21">
@@ -4026,7 +4032,7 @@
             </p:txBody>
           </p:sp>
         </mc:Choice>
-        <mc:Fallback>
+        <mc:Fallback xmlns="">
           <p:sp>
             <p:nvSpPr>
               <p:cNvPr id="22" name="TextBox 21">
@@ -4071,8 +4077,8 @@
           </p:sp>
         </mc:Fallback>
       </mc:AlternateContent>
-      <mc:AlternateContent xmlns:mc="http://schemas.openxmlformats.org/markup-compatibility/2006">
-        <mc:Choice xmlns:a14="http://schemas.microsoft.com/office/drawing/2010/main" Requires="a14">
+      <mc:AlternateContent xmlns:mc="http://schemas.openxmlformats.org/markup-compatibility/2006" xmlns:a14="http://schemas.microsoft.com/office/drawing/2010/main">
+        <mc:Choice Requires="a14">
           <p:sp>
             <p:nvSpPr>
               <p:cNvPr id="23" name="TextBox 22">
@@ -4152,7 +4158,7 @@
             </p:txBody>
           </p:sp>
         </mc:Choice>
-        <mc:Fallback>
+        <mc:Fallback xmlns="">
           <p:sp>
             <p:nvSpPr>
               <p:cNvPr id="23" name="TextBox 22">
@@ -4247,8 +4253,8 @@
           </a:fontRef>
         </p:style>
       </p:cxnSp>
-      <mc:AlternateContent xmlns:mc="http://schemas.openxmlformats.org/markup-compatibility/2006">
-        <mc:Choice xmlns:a14="http://schemas.microsoft.com/office/drawing/2010/main" Requires="a14">
+      <mc:AlternateContent xmlns:mc="http://schemas.openxmlformats.org/markup-compatibility/2006" xmlns:a14="http://schemas.microsoft.com/office/drawing/2010/main">
+        <mc:Choice Requires="a14">
           <p:sp>
             <p:nvSpPr>
               <p:cNvPr id="25" name="TextBox 24">
@@ -4339,7 +4345,7 @@
             </p:txBody>
           </p:sp>
         </mc:Choice>
-        <mc:Fallback>
+        <mc:Fallback xmlns="">
           <p:sp>
             <p:nvSpPr>
               <p:cNvPr id="25" name="TextBox 24">
@@ -4888,8 +4894,8 @@
           </a:fontRef>
         </p:style>
       </p:cxnSp>
-      <mc:AlternateContent xmlns:mc="http://schemas.openxmlformats.org/markup-compatibility/2006">
-        <mc:Choice xmlns:a14="http://schemas.microsoft.com/office/drawing/2010/main" Requires="a14">
+      <mc:AlternateContent xmlns:mc="http://schemas.openxmlformats.org/markup-compatibility/2006" xmlns:a14="http://schemas.microsoft.com/office/drawing/2010/main">
+        <mc:Choice Requires="a14">
           <p:sp>
             <p:nvSpPr>
               <p:cNvPr id="53" name="TextBox 52">
@@ -4964,7 +4970,7 @@
             </p:txBody>
           </p:sp>
         </mc:Choice>
-        <mc:Fallback>
+        <mc:Fallback xmlns="">
           <p:sp>
             <p:nvSpPr>
               <p:cNvPr id="53" name="TextBox 52">
@@ -5009,8 +5015,8 @@
           </p:sp>
         </mc:Fallback>
       </mc:AlternateContent>
-      <mc:AlternateContent xmlns:mc="http://schemas.openxmlformats.org/markup-compatibility/2006">
-        <mc:Choice xmlns:a14="http://schemas.microsoft.com/office/drawing/2010/main" Requires="a14">
+      <mc:AlternateContent xmlns:mc="http://schemas.openxmlformats.org/markup-compatibility/2006" xmlns:a14="http://schemas.microsoft.com/office/drawing/2010/main">
+        <mc:Choice Requires="a14">
           <p:sp>
             <p:nvSpPr>
               <p:cNvPr id="54" name="TextBox 53">
@@ -5085,7 +5091,7 @@
             </p:txBody>
           </p:sp>
         </mc:Choice>
-        <mc:Fallback>
+        <mc:Fallback xmlns="">
           <p:sp>
             <p:nvSpPr>
               <p:cNvPr id="54" name="TextBox 53">
@@ -5130,8 +5136,8 @@
           </p:sp>
         </mc:Fallback>
       </mc:AlternateContent>
-      <mc:AlternateContent xmlns:mc="http://schemas.openxmlformats.org/markup-compatibility/2006">
-        <mc:Choice xmlns:a14="http://schemas.microsoft.com/office/drawing/2010/main" Requires="a14">
+      <mc:AlternateContent xmlns:mc="http://schemas.openxmlformats.org/markup-compatibility/2006" xmlns:a14="http://schemas.microsoft.com/office/drawing/2010/main">
+        <mc:Choice Requires="a14">
           <p:sp>
             <p:nvSpPr>
               <p:cNvPr id="55" name="TextBox 54">
@@ -5196,13 +5202,7 @@
                         <a:rPr lang="en-US" sz="1400" b="0" i="1" smtClean="0">
                           <a:latin typeface="Cambria Math" panose="02040503050406030204" pitchFamily="18" charset="0"/>
                         </a:rPr>
-                        <m:t>=0.</m:t>
-                      </m:r>
-                      <m:r>
-                        <a:rPr lang="en-US" sz="1400" b="0" i="1" smtClean="0">
-                          <a:latin typeface="Cambria Math" panose="02040503050406030204" pitchFamily="18" charset="0"/>
-                        </a:rPr>
-                        <m:t>3</m:t>
+                        <m:t>=0.3</m:t>
                       </m:r>
                     </m:oMath>
                   </m:oMathPara>
@@ -5212,7 +5212,7 @@
             </p:txBody>
           </p:sp>
         </mc:Choice>
-        <mc:Fallback>
+        <mc:Fallback xmlns="">
           <p:sp>
             <p:nvSpPr>
               <p:cNvPr id="55" name="TextBox 54">
@@ -5257,8 +5257,8 @@
           </p:sp>
         </mc:Fallback>
       </mc:AlternateContent>
-      <mc:AlternateContent xmlns:mc="http://schemas.openxmlformats.org/markup-compatibility/2006">
-        <mc:Choice xmlns:a14="http://schemas.microsoft.com/office/drawing/2010/main" Requires="a14">
+      <mc:AlternateContent xmlns:mc="http://schemas.openxmlformats.org/markup-compatibility/2006" xmlns:a14="http://schemas.microsoft.com/office/drawing/2010/main">
+        <mc:Choice Requires="a14">
           <p:sp>
             <p:nvSpPr>
               <p:cNvPr id="56" name="TextBox 55">
@@ -5323,13 +5323,7 @@
                         <a:rPr lang="en-US" sz="1400" b="0" i="1" smtClean="0">
                           <a:latin typeface="Cambria Math" panose="02040503050406030204" pitchFamily="18" charset="0"/>
                         </a:rPr>
-                        <m:t>=0.</m:t>
-                      </m:r>
-                      <m:r>
-                        <a:rPr lang="en-US" sz="1400" b="0" i="1" smtClean="0">
-                          <a:latin typeface="Cambria Math" panose="02040503050406030204" pitchFamily="18" charset="0"/>
-                        </a:rPr>
-                        <m:t>4</m:t>
+                        <m:t>=0.4</m:t>
                       </m:r>
                     </m:oMath>
                   </m:oMathPara>
@@ -5339,7 +5333,7 @@
             </p:txBody>
           </p:sp>
         </mc:Choice>
-        <mc:Fallback>
+        <mc:Fallback xmlns="">
           <p:sp>
             <p:nvSpPr>
               <p:cNvPr id="56" name="TextBox 55">
@@ -5384,8 +5378,8 @@
           </p:sp>
         </mc:Fallback>
       </mc:AlternateContent>
-      <mc:AlternateContent xmlns:mc="http://schemas.openxmlformats.org/markup-compatibility/2006">
-        <mc:Choice xmlns:a14="http://schemas.microsoft.com/office/drawing/2010/main" Requires="a14">
+      <mc:AlternateContent xmlns:mc="http://schemas.openxmlformats.org/markup-compatibility/2006" xmlns:a14="http://schemas.microsoft.com/office/drawing/2010/main">
+        <mc:Choice Requires="a14">
           <p:sp>
             <p:nvSpPr>
               <p:cNvPr id="57" name="TextBox 56">
@@ -5450,13 +5444,7 @@
                         <a:rPr lang="en-US" sz="1400" b="0" i="1" smtClean="0">
                           <a:latin typeface="Cambria Math" panose="02040503050406030204" pitchFamily="18" charset="0"/>
                         </a:rPr>
-                        <m:t>=0.</m:t>
-                      </m:r>
-                      <m:r>
-                        <a:rPr lang="en-US" sz="1400" b="0" i="1" smtClean="0">
-                          <a:latin typeface="Cambria Math" panose="02040503050406030204" pitchFamily="18" charset="0"/>
-                        </a:rPr>
-                        <m:t>5</m:t>
+                        <m:t>=0.5</m:t>
                       </m:r>
                     </m:oMath>
                   </m:oMathPara>
@@ -5466,7 +5454,7 @@
             </p:txBody>
           </p:sp>
         </mc:Choice>
-        <mc:Fallback>
+        <mc:Fallback xmlns="">
           <p:sp>
             <p:nvSpPr>
               <p:cNvPr id="57" name="TextBox 56">
@@ -5511,8 +5499,8 @@
           </p:sp>
         </mc:Fallback>
       </mc:AlternateContent>
-      <mc:AlternateContent xmlns:mc="http://schemas.openxmlformats.org/markup-compatibility/2006">
-        <mc:Choice xmlns:a14="http://schemas.microsoft.com/office/drawing/2010/main" Requires="a14">
+      <mc:AlternateContent xmlns:mc="http://schemas.openxmlformats.org/markup-compatibility/2006" xmlns:a14="http://schemas.microsoft.com/office/drawing/2010/main">
+        <mc:Choice Requires="a14">
           <p:sp>
             <p:nvSpPr>
               <p:cNvPr id="58" name="TextBox 57">
@@ -5577,13 +5565,7 @@
                         <a:rPr lang="en-US" sz="1400" b="0" i="1" smtClean="0">
                           <a:latin typeface="Cambria Math" panose="02040503050406030204" pitchFamily="18" charset="0"/>
                         </a:rPr>
-                        <m:t>=0.</m:t>
-                      </m:r>
-                      <m:r>
-                        <a:rPr lang="en-US" sz="1400" b="0" i="1" smtClean="0">
-                          <a:latin typeface="Cambria Math" panose="02040503050406030204" pitchFamily="18" charset="0"/>
-                        </a:rPr>
-                        <m:t>6</m:t>
+                        <m:t>=0.6</m:t>
                       </m:r>
                     </m:oMath>
                   </m:oMathPara>
@@ -5593,7 +5575,7 @@
             </p:txBody>
           </p:sp>
         </mc:Choice>
-        <mc:Fallback>
+        <mc:Fallback xmlns="">
           <p:sp>
             <p:nvSpPr>
               <p:cNvPr id="58" name="TextBox 57">
@@ -5638,8 +5620,8 @@
           </p:sp>
         </mc:Fallback>
       </mc:AlternateContent>
-      <mc:AlternateContent xmlns:mc="http://schemas.openxmlformats.org/markup-compatibility/2006">
-        <mc:Choice xmlns:a14="http://schemas.microsoft.com/office/drawing/2010/main" Requires="a14">
+      <mc:AlternateContent xmlns:mc="http://schemas.openxmlformats.org/markup-compatibility/2006" xmlns:a14="http://schemas.microsoft.com/office/drawing/2010/main">
+        <mc:Choice Requires="a14">
           <p:sp>
             <p:nvSpPr>
               <p:cNvPr id="59" name="TextBox 58">
@@ -5704,13 +5686,7 @@
                         <a:rPr lang="en-US" sz="1400" b="0" i="1" smtClean="0">
                           <a:latin typeface="Cambria Math" panose="02040503050406030204" pitchFamily="18" charset="0"/>
                         </a:rPr>
-                        <m:t>=0.</m:t>
-                      </m:r>
-                      <m:r>
-                        <a:rPr lang="en-US" sz="1400" b="0" i="1" smtClean="0">
-                          <a:latin typeface="Cambria Math" panose="02040503050406030204" pitchFamily="18" charset="0"/>
-                        </a:rPr>
-                        <m:t>7</m:t>
+                        <m:t>=0.7</m:t>
                       </m:r>
                     </m:oMath>
                   </m:oMathPara>
@@ -5720,7 +5696,7 @@
             </p:txBody>
           </p:sp>
         </mc:Choice>
-        <mc:Fallback>
+        <mc:Fallback xmlns="">
           <p:sp>
             <p:nvSpPr>
               <p:cNvPr id="59" name="TextBox 58">
@@ -5765,8 +5741,8 @@
           </p:sp>
         </mc:Fallback>
       </mc:AlternateContent>
-      <mc:AlternateContent xmlns:mc="http://schemas.openxmlformats.org/markup-compatibility/2006">
-        <mc:Choice xmlns:a14="http://schemas.microsoft.com/office/drawing/2010/main" Requires="a14">
+      <mc:AlternateContent xmlns:mc="http://schemas.openxmlformats.org/markup-compatibility/2006" xmlns:a14="http://schemas.microsoft.com/office/drawing/2010/main">
+        <mc:Choice Requires="a14">
           <p:sp>
             <p:nvSpPr>
               <p:cNvPr id="60" name="TextBox 59">
@@ -5831,13 +5807,7 @@
                         <a:rPr lang="en-US" sz="1400" b="0" i="1" smtClean="0">
                           <a:latin typeface="Cambria Math" panose="02040503050406030204" pitchFamily="18" charset="0"/>
                         </a:rPr>
-                        <m:t>=0.</m:t>
-                      </m:r>
-                      <m:r>
-                        <a:rPr lang="en-US" sz="1400" b="0" i="1" smtClean="0">
-                          <a:latin typeface="Cambria Math" panose="02040503050406030204" pitchFamily="18" charset="0"/>
-                        </a:rPr>
-                        <m:t>8</m:t>
+                        <m:t>=0.8</m:t>
                       </m:r>
                     </m:oMath>
                   </m:oMathPara>
@@ -5847,7 +5817,7 @@
             </p:txBody>
           </p:sp>
         </mc:Choice>
-        <mc:Fallback>
+        <mc:Fallback xmlns="">
           <p:sp>
             <p:nvSpPr>
               <p:cNvPr id="60" name="TextBox 59">
@@ -5892,8 +5862,8 @@
           </p:sp>
         </mc:Fallback>
       </mc:AlternateContent>
-      <mc:AlternateContent xmlns:mc="http://schemas.openxmlformats.org/markup-compatibility/2006">
-        <mc:Choice xmlns:a14="http://schemas.microsoft.com/office/drawing/2010/main" Requires="a14">
+      <mc:AlternateContent xmlns:mc="http://schemas.openxmlformats.org/markup-compatibility/2006" xmlns:a14="http://schemas.microsoft.com/office/drawing/2010/main">
+        <mc:Choice Requires="a14">
           <p:sp>
             <p:nvSpPr>
               <p:cNvPr id="61" name="TextBox 60">
@@ -5958,13 +5928,7 @@
                         <a:rPr lang="en-US" sz="1400" b="0" i="1" smtClean="0">
                           <a:latin typeface="Cambria Math" panose="02040503050406030204" pitchFamily="18" charset="0"/>
                         </a:rPr>
-                        <m:t>=0.</m:t>
-                      </m:r>
-                      <m:r>
-                        <a:rPr lang="en-US" sz="1400" b="0" i="1" smtClean="0">
-                          <a:latin typeface="Cambria Math" panose="02040503050406030204" pitchFamily="18" charset="0"/>
-                        </a:rPr>
-                        <m:t>9</m:t>
+                        <m:t>=0.9</m:t>
                       </m:r>
                     </m:oMath>
                   </m:oMathPara>
@@ -5974,7 +5938,7 @@
             </p:txBody>
           </p:sp>
         </mc:Choice>
-        <mc:Fallback>
+        <mc:Fallback xmlns="">
           <p:sp>
             <p:nvSpPr>
               <p:cNvPr id="61" name="TextBox 60">
@@ -6019,8 +5983,8 @@
           </p:sp>
         </mc:Fallback>
       </mc:AlternateContent>
-      <mc:AlternateContent xmlns:mc="http://schemas.openxmlformats.org/markup-compatibility/2006">
-        <mc:Choice xmlns:a14="http://schemas.microsoft.com/office/drawing/2010/main" Requires="a14">
+      <mc:AlternateContent xmlns:mc="http://schemas.openxmlformats.org/markup-compatibility/2006" xmlns:a14="http://schemas.microsoft.com/office/drawing/2010/main">
+        <mc:Choice Requires="a14">
           <p:sp>
             <p:nvSpPr>
               <p:cNvPr id="62" name="TextBox 61">
@@ -6085,13 +6049,7 @@
                         <a:rPr lang="en-US" sz="1400" b="0" i="1" smtClean="0">
                           <a:latin typeface="Cambria Math" panose="02040503050406030204" pitchFamily="18" charset="0"/>
                         </a:rPr>
-                        <m:t>=</m:t>
-                      </m:r>
-                      <m:r>
-                        <a:rPr lang="en-US" sz="1400" b="0" i="1" smtClean="0">
-                          <a:latin typeface="Cambria Math" panose="02040503050406030204" pitchFamily="18" charset="0"/>
-                        </a:rPr>
-                        <m:t>1</m:t>
+                        <m:t>=1</m:t>
                       </m:r>
                     </m:oMath>
                   </m:oMathPara>
@@ -6101,7 +6059,7 @@
             </p:txBody>
           </p:sp>
         </mc:Choice>
-        <mc:Fallback>
+        <mc:Fallback xmlns="">
           <p:sp>
             <p:nvSpPr>
               <p:cNvPr id="62" name="TextBox 61">
@@ -7193,8 +7151,8 @@
           </a:fontRef>
         </p:style>
       </p:cxnSp>
-      <mc:AlternateContent xmlns:mc="http://schemas.openxmlformats.org/markup-compatibility/2006">
-        <mc:Choice xmlns:a14="http://schemas.microsoft.com/office/drawing/2010/main" Requires="a14">
+      <mc:AlternateContent xmlns:mc="http://schemas.openxmlformats.org/markup-compatibility/2006" xmlns:a14="http://schemas.microsoft.com/office/drawing/2010/main">
+        <mc:Choice Requires="a14">
           <p:sp>
             <p:nvSpPr>
               <p:cNvPr id="22" name="TextBox 21">
@@ -7331,7 +7289,7 @@
             </p:txBody>
           </p:sp>
         </mc:Choice>
-        <mc:Fallback>
+        <mc:Fallback xmlns="">
           <p:sp>
             <p:nvSpPr>
               <p:cNvPr id="22" name="TextBox 21">
@@ -7376,8 +7334,8 @@
           </p:sp>
         </mc:Fallback>
       </mc:AlternateContent>
-      <mc:AlternateContent xmlns:mc="http://schemas.openxmlformats.org/markup-compatibility/2006">
-        <mc:Choice xmlns:a14="http://schemas.microsoft.com/office/drawing/2010/main" Requires="a14">
+      <mc:AlternateContent xmlns:mc="http://schemas.openxmlformats.org/markup-compatibility/2006" xmlns:a14="http://schemas.microsoft.com/office/drawing/2010/main">
+        <mc:Choice Requires="a14">
           <p:sp>
             <p:nvSpPr>
               <p:cNvPr id="23" name="TextBox 22">
@@ -7457,7 +7415,7 @@
             </p:txBody>
           </p:sp>
         </mc:Choice>
-        <mc:Fallback>
+        <mc:Fallback xmlns="">
           <p:sp>
             <p:nvSpPr>
               <p:cNvPr id="23" name="TextBox 22">
@@ -7552,8 +7510,8 @@
           </a:fontRef>
         </p:style>
       </p:cxnSp>
-      <mc:AlternateContent xmlns:mc="http://schemas.openxmlformats.org/markup-compatibility/2006">
-        <mc:Choice xmlns:a14="http://schemas.microsoft.com/office/drawing/2010/main" Requires="a14">
+      <mc:AlternateContent xmlns:mc="http://schemas.openxmlformats.org/markup-compatibility/2006" xmlns:a14="http://schemas.microsoft.com/office/drawing/2010/main">
+        <mc:Choice Requires="a14">
           <p:sp>
             <p:nvSpPr>
               <p:cNvPr id="25" name="TextBox 24">
@@ -7644,7 +7602,7 @@
             </p:txBody>
           </p:sp>
         </mc:Choice>
-        <mc:Fallback>
+        <mc:Fallback xmlns="">
           <p:sp>
             <p:nvSpPr>
               <p:cNvPr id="25" name="TextBox 24">
@@ -8193,8 +8151,8 @@
           </a:fontRef>
         </p:style>
       </p:cxnSp>
-      <mc:AlternateContent xmlns:mc="http://schemas.openxmlformats.org/markup-compatibility/2006">
-        <mc:Choice xmlns:a14="http://schemas.microsoft.com/office/drawing/2010/main" Requires="a14">
+      <mc:AlternateContent xmlns:mc="http://schemas.openxmlformats.org/markup-compatibility/2006" xmlns:a14="http://schemas.microsoft.com/office/drawing/2010/main">
+        <mc:Choice Requires="a14">
           <p:sp>
             <p:nvSpPr>
               <p:cNvPr id="53" name="TextBox 52">
@@ -8269,7 +8227,7 @@
             </p:txBody>
           </p:sp>
         </mc:Choice>
-        <mc:Fallback>
+        <mc:Fallback xmlns="">
           <p:sp>
             <p:nvSpPr>
               <p:cNvPr id="53" name="TextBox 52">
@@ -8314,8 +8272,8 @@
           </p:sp>
         </mc:Fallback>
       </mc:AlternateContent>
-      <mc:AlternateContent xmlns:mc="http://schemas.openxmlformats.org/markup-compatibility/2006">
-        <mc:Choice xmlns:a14="http://schemas.microsoft.com/office/drawing/2010/main" Requires="a14">
+      <mc:AlternateContent xmlns:mc="http://schemas.openxmlformats.org/markup-compatibility/2006" xmlns:a14="http://schemas.microsoft.com/office/drawing/2010/main">
+        <mc:Choice Requires="a14">
           <p:sp>
             <p:nvSpPr>
               <p:cNvPr id="54" name="TextBox 53">
@@ -8390,7 +8348,7 @@
             </p:txBody>
           </p:sp>
         </mc:Choice>
-        <mc:Fallback>
+        <mc:Fallback xmlns="">
           <p:sp>
             <p:nvSpPr>
               <p:cNvPr id="54" name="TextBox 53">
@@ -8435,8 +8393,8 @@
           </p:sp>
         </mc:Fallback>
       </mc:AlternateContent>
-      <mc:AlternateContent xmlns:mc="http://schemas.openxmlformats.org/markup-compatibility/2006">
-        <mc:Choice xmlns:a14="http://schemas.microsoft.com/office/drawing/2010/main" Requires="a14">
+      <mc:AlternateContent xmlns:mc="http://schemas.openxmlformats.org/markup-compatibility/2006" xmlns:a14="http://schemas.microsoft.com/office/drawing/2010/main">
+        <mc:Choice Requires="a14">
           <p:sp>
             <p:nvSpPr>
               <p:cNvPr id="55" name="TextBox 54">
@@ -8501,13 +8459,7 @@
                         <a:rPr lang="en-US" sz="1400" b="0" i="1" smtClean="0">
                           <a:latin typeface="Cambria Math" panose="02040503050406030204" pitchFamily="18" charset="0"/>
                         </a:rPr>
-                        <m:t>=0.</m:t>
-                      </m:r>
-                      <m:r>
-                        <a:rPr lang="en-US" sz="1400" b="0" i="1" smtClean="0">
-                          <a:latin typeface="Cambria Math" panose="02040503050406030204" pitchFamily="18" charset="0"/>
-                        </a:rPr>
-                        <m:t>3</m:t>
+                        <m:t>=0.3</m:t>
                       </m:r>
                     </m:oMath>
                   </m:oMathPara>
@@ -8517,7 +8469,7 @@
             </p:txBody>
           </p:sp>
         </mc:Choice>
-        <mc:Fallback>
+        <mc:Fallback xmlns="">
           <p:sp>
             <p:nvSpPr>
               <p:cNvPr id="55" name="TextBox 54">
@@ -8562,8 +8514,8 @@
           </p:sp>
         </mc:Fallback>
       </mc:AlternateContent>
-      <mc:AlternateContent xmlns:mc="http://schemas.openxmlformats.org/markup-compatibility/2006">
-        <mc:Choice xmlns:a14="http://schemas.microsoft.com/office/drawing/2010/main" Requires="a14">
+      <mc:AlternateContent xmlns:mc="http://schemas.openxmlformats.org/markup-compatibility/2006" xmlns:a14="http://schemas.microsoft.com/office/drawing/2010/main">
+        <mc:Choice Requires="a14">
           <p:sp>
             <p:nvSpPr>
               <p:cNvPr id="56" name="TextBox 55">
@@ -8628,13 +8580,7 @@
                         <a:rPr lang="en-US" sz="1400" b="0" i="1" smtClean="0">
                           <a:latin typeface="Cambria Math" panose="02040503050406030204" pitchFamily="18" charset="0"/>
                         </a:rPr>
-                        <m:t>=0.</m:t>
-                      </m:r>
-                      <m:r>
-                        <a:rPr lang="en-US" sz="1400" b="0" i="1" smtClean="0">
-                          <a:latin typeface="Cambria Math" panose="02040503050406030204" pitchFamily="18" charset="0"/>
-                        </a:rPr>
-                        <m:t>4</m:t>
+                        <m:t>=0.4</m:t>
                       </m:r>
                     </m:oMath>
                   </m:oMathPara>
@@ -8644,7 +8590,7 @@
             </p:txBody>
           </p:sp>
         </mc:Choice>
-        <mc:Fallback>
+        <mc:Fallback xmlns="">
           <p:sp>
             <p:nvSpPr>
               <p:cNvPr id="56" name="TextBox 55">
@@ -8689,8 +8635,8 @@
           </p:sp>
         </mc:Fallback>
       </mc:AlternateContent>
-      <mc:AlternateContent xmlns:mc="http://schemas.openxmlformats.org/markup-compatibility/2006">
-        <mc:Choice xmlns:a14="http://schemas.microsoft.com/office/drawing/2010/main" Requires="a14">
+      <mc:AlternateContent xmlns:mc="http://schemas.openxmlformats.org/markup-compatibility/2006" xmlns:a14="http://schemas.microsoft.com/office/drawing/2010/main">
+        <mc:Choice Requires="a14">
           <p:sp>
             <p:nvSpPr>
               <p:cNvPr id="57" name="TextBox 56">
@@ -8755,13 +8701,7 @@
                         <a:rPr lang="en-US" sz="1400" b="0" i="1" smtClean="0">
                           <a:latin typeface="Cambria Math" panose="02040503050406030204" pitchFamily="18" charset="0"/>
                         </a:rPr>
-                        <m:t>=0.</m:t>
-                      </m:r>
-                      <m:r>
-                        <a:rPr lang="en-US" sz="1400" b="0" i="1" smtClean="0">
-                          <a:latin typeface="Cambria Math" panose="02040503050406030204" pitchFamily="18" charset="0"/>
-                        </a:rPr>
-                        <m:t>5</m:t>
+                        <m:t>=0.5</m:t>
                       </m:r>
                     </m:oMath>
                   </m:oMathPara>
@@ -8771,7 +8711,7 @@
             </p:txBody>
           </p:sp>
         </mc:Choice>
-        <mc:Fallback>
+        <mc:Fallback xmlns="">
           <p:sp>
             <p:nvSpPr>
               <p:cNvPr id="57" name="TextBox 56">
@@ -8816,8 +8756,8 @@
           </p:sp>
         </mc:Fallback>
       </mc:AlternateContent>
-      <mc:AlternateContent xmlns:mc="http://schemas.openxmlformats.org/markup-compatibility/2006">
-        <mc:Choice xmlns:a14="http://schemas.microsoft.com/office/drawing/2010/main" Requires="a14">
+      <mc:AlternateContent xmlns:mc="http://schemas.openxmlformats.org/markup-compatibility/2006" xmlns:a14="http://schemas.microsoft.com/office/drawing/2010/main">
+        <mc:Choice Requires="a14">
           <p:sp>
             <p:nvSpPr>
               <p:cNvPr id="58" name="TextBox 57">
@@ -8882,13 +8822,7 @@
                         <a:rPr lang="en-US" sz="1400" b="0" i="1" smtClean="0">
                           <a:latin typeface="Cambria Math" panose="02040503050406030204" pitchFamily="18" charset="0"/>
                         </a:rPr>
-                        <m:t>=0.</m:t>
-                      </m:r>
-                      <m:r>
-                        <a:rPr lang="en-US" sz="1400" b="0" i="1" smtClean="0">
-                          <a:latin typeface="Cambria Math" panose="02040503050406030204" pitchFamily="18" charset="0"/>
-                        </a:rPr>
-                        <m:t>6</m:t>
+                        <m:t>=0.6</m:t>
                       </m:r>
                     </m:oMath>
                   </m:oMathPara>
@@ -8898,7 +8832,7 @@
             </p:txBody>
           </p:sp>
         </mc:Choice>
-        <mc:Fallback>
+        <mc:Fallback xmlns="">
           <p:sp>
             <p:nvSpPr>
               <p:cNvPr id="58" name="TextBox 57">
@@ -8943,8 +8877,8 @@
           </p:sp>
         </mc:Fallback>
       </mc:AlternateContent>
-      <mc:AlternateContent xmlns:mc="http://schemas.openxmlformats.org/markup-compatibility/2006">
-        <mc:Choice xmlns:a14="http://schemas.microsoft.com/office/drawing/2010/main" Requires="a14">
+      <mc:AlternateContent xmlns:mc="http://schemas.openxmlformats.org/markup-compatibility/2006" xmlns:a14="http://schemas.microsoft.com/office/drawing/2010/main">
+        <mc:Choice Requires="a14">
           <p:sp>
             <p:nvSpPr>
               <p:cNvPr id="59" name="TextBox 58">
@@ -9009,13 +8943,7 @@
                         <a:rPr lang="en-US" sz="1400" b="0" i="1" smtClean="0">
                           <a:latin typeface="Cambria Math" panose="02040503050406030204" pitchFamily="18" charset="0"/>
                         </a:rPr>
-                        <m:t>=0.</m:t>
-                      </m:r>
-                      <m:r>
-                        <a:rPr lang="en-US" sz="1400" b="0" i="1" smtClean="0">
-                          <a:latin typeface="Cambria Math" panose="02040503050406030204" pitchFamily="18" charset="0"/>
-                        </a:rPr>
-                        <m:t>7</m:t>
+                        <m:t>=0.7</m:t>
                       </m:r>
                     </m:oMath>
                   </m:oMathPara>
@@ -9025,7 +8953,7 @@
             </p:txBody>
           </p:sp>
         </mc:Choice>
-        <mc:Fallback>
+        <mc:Fallback xmlns="">
           <p:sp>
             <p:nvSpPr>
               <p:cNvPr id="59" name="TextBox 58">
@@ -9070,8 +8998,8 @@
           </p:sp>
         </mc:Fallback>
       </mc:AlternateContent>
-      <mc:AlternateContent xmlns:mc="http://schemas.openxmlformats.org/markup-compatibility/2006">
-        <mc:Choice xmlns:a14="http://schemas.microsoft.com/office/drawing/2010/main" Requires="a14">
+      <mc:AlternateContent xmlns:mc="http://schemas.openxmlformats.org/markup-compatibility/2006" xmlns:a14="http://schemas.microsoft.com/office/drawing/2010/main">
+        <mc:Choice Requires="a14">
           <p:sp>
             <p:nvSpPr>
               <p:cNvPr id="60" name="TextBox 59">
@@ -9136,13 +9064,7 @@
                         <a:rPr lang="en-US" sz="1400" b="0" i="1" smtClean="0">
                           <a:latin typeface="Cambria Math" panose="02040503050406030204" pitchFamily="18" charset="0"/>
                         </a:rPr>
-                        <m:t>=0.</m:t>
-                      </m:r>
-                      <m:r>
-                        <a:rPr lang="en-US" sz="1400" b="0" i="1" smtClean="0">
-                          <a:latin typeface="Cambria Math" panose="02040503050406030204" pitchFamily="18" charset="0"/>
-                        </a:rPr>
-                        <m:t>8</m:t>
+                        <m:t>=0.8</m:t>
                       </m:r>
                     </m:oMath>
                   </m:oMathPara>
@@ -9152,7 +9074,7 @@
             </p:txBody>
           </p:sp>
         </mc:Choice>
-        <mc:Fallback>
+        <mc:Fallback xmlns="">
           <p:sp>
             <p:nvSpPr>
               <p:cNvPr id="60" name="TextBox 59">
@@ -9197,8 +9119,8 @@
           </p:sp>
         </mc:Fallback>
       </mc:AlternateContent>
-      <mc:AlternateContent xmlns:mc="http://schemas.openxmlformats.org/markup-compatibility/2006">
-        <mc:Choice xmlns:a14="http://schemas.microsoft.com/office/drawing/2010/main" Requires="a14">
+      <mc:AlternateContent xmlns:mc="http://schemas.openxmlformats.org/markup-compatibility/2006" xmlns:a14="http://schemas.microsoft.com/office/drawing/2010/main">
+        <mc:Choice Requires="a14">
           <p:sp>
             <p:nvSpPr>
               <p:cNvPr id="61" name="TextBox 60">
@@ -9263,13 +9185,7 @@
                         <a:rPr lang="en-US" sz="1400" b="0" i="1" smtClean="0">
                           <a:latin typeface="Cambria Math" panose="02040503050406030204" pitchFamily="18" charset="0"/>
                         </a:rPr>
-                        <m:t>=0.</m:t>
-                      </m:r>
-                      <m:r>
-                        <a:rPr lang="en-US" sz="1400" b="0" i="1" smtClean="0">
-                          <a:latin typeface="Cambria Math" panose="02040503050406030204" pitchFamily="18" charset="0"/>
-                        </a:rPr>
-                        <m:t>9</m:t>
+                        <m:t>=0.9</m:t>
                       </m:r>
                     </m:oMath>
                   </m:oMathPara>
@@ -9279,7 +9195,7 @@
             </p:txBody>
           </p:sp>
         </mc:Choice>
-        <mc:Fallback>
+        <mc:Fallback xmlns="">
           <p:sp>
             <p:nvSpPr>
               <p:cNvPr id="61" name="TextBox 60">
@@ -9324,8 +9240,8 @@
           </p:sp>
         </mc:Fallback>
       </mc:AlternateContent>
-      <mc:AlternateContent xmlns:mc="http://schemas.openxmlformats.org/markup-compatibility/2006">
-        <mc:Choice xmlns:a14="http://schemas.microsoft.com/office/drawing/2010/main" Requires="a14">
+      <mc:AlternateContent xmlns:mc="http://schemas.openxmlformats.org/markup-compatibility/2006" xmlns:a14="http://schemas.microsoft.com/office/drawing/2010/main">
+        <mc:Choice Requires="a14">
           <p:sp>
             <p:nvSpPr>
               <p:cNvPr id="62" name="TextBox 61">
@@ -9390,13 +9306,7 @@
                         <a:rPr lang="en-US" sz="1400" b="0" i="1" smtClean="0">
                           <a:latin typeface="Cambria Math" panose="02040503050406030204" pitchFamily="18" charset="0"/>
                         </a:rPr>
-                        <m:t>=</m:t>
-                      </m:r>
-                      <m:r>
-                        <a:rPr lang="en-US" sz="1400" b="0" i="1" smtClean="0">
-                          <a:latin typeface="Cambria Math" panose="02040503050406030204" pitchFamily="18" charset="0"/>
-                        </a:rPr>
-                        <m:t>1</m:t>
+                        <m:t>=1</m:t>
                       </m:r>
                     </m:oMath>
                   </m:oMathPara>
@@ -9406,7 +9316,7 @@
             </p:txBody>
           </p:sp>
         </mc:Choice>
-        <mc:Fallback>
+        <mc:Fallback xmlns="">
           <p:sp>
             <p:nvSpPr>
               <p:cNvPr id="62" name="TextBox 61">
@@ -9906,6 +9816,3682 @@
     <p:extLst>
       <p:ext uri="{BB962C8B-B14F-4D97-AF65-F5344CB8AC3E}">
         <p14:creationId xmlns:p14="http://schemas.microsoft.com/office/powerpoint/2010/main" val="741778189"/>
+      </p:ext>
+    </p:extLst>
+  </p:cSld>
+  <p:clrMapOvr>
+    <a:masterClrMapping/>
+  </p:clrMapOvr>
+</p:sld>
+</file>
+
+<file path=ppt/slides/slide3.xml><?xml version="1.0" encoding="utf-8"?>
+<p:sld xmlns:a="http://schemas.openxmlformats.org/drawingml/2006/main" xmlns:r="http://schemas.openxmlformats.org/officeDocument/2006/relationships" xmlns:p="http://schemas.openxmlformats.org/presentationml/2006/main">
+  <p:cSld>
+    <p:spTree>
+      <p:nvGrpSpPr>
+        <p:cNvPr id="1" name=""/>
+        <p:cNvGrpSpPr/>
+        <p:nvPr/>
+      </p:nvGrpSpPr>
+      <p:grpSpPr>
+        <a:xfrm>
+          <a:off x="0" y="0"/>
+          <a:ext cx="0" cy="0"/>
+          <a:chOff x="0" y="0"/>
+          <a:chExt cx="0" cy="0"/>
+        </a:xfrm>
+      </p:grpSpPr>
+      <p:pic>
+        <p:nvPicPr>
+          <p:cNvPr id="7" name="Picture 6">
+            <a:extLst>
+              <a:ext uri="{FF2B5EF4-FFF2-40B4-BE49-F238E27FC236}">
+                <a16:creationId xmlns:a16="http://schemas.microsoft.com/office/drawing/2014/main" id="{351793F5-1840-402E-B354-02D398A8AB0C}"/>
+              </a:ext>
+            </a:extLst>
+          </p:cNvPr>
+          <p:cNvPicPr>
+            <a:picLocks noChangeAspect="1"/>
+          </p:cNvPicPr>
+          <p:nvPr/>
+        </p:nvPicPr>
+        <p:blipFill rotWithShape="1">
+          <a:blip r:embed="rId2"/>
+          <a:srcRect l="7902" r="7280" b="6660"/>
+          <a:stretch/>
+        </p:blipFill>
+        <p:spPr>
+          <a:xfrm>
+            <a:off x="532660" y="705682"/>
+            <a:ext cx="8078896" cy="3111716"/>
+          </a:xfrm>
+          <a:prstGeom prst="rect">
+            <a:avLst/>
+          </a:prstGeom>
+        </p:spPr>
+      </p:pic>
+      <p:cxnSp>
+        <p:nvCxnSpPr>
+          <p:cNvPr id="10" name="Straight Connector 9">
+            <a:extLst>
+              <a:ext uri="{FF2B5EF4-FFF2-40B4-BE49-F238E27FC236}">
+                <a16:creationId xmlns:a16="http://schemas.microsoft.com/office/drawing/2014/main" id="{4CCD91B5-2FDE-44D7-9C58-5367ACBE8112}"/>
+              </a:ext>
+            </a:extLst>
+          </p:cNvPr>
+          <p:cNvCxnSpPr>
+            <a:cxnSpLocks/>
+          </p:cNvCxnSpPr>
+          <p:nvPr/>
+        </p:nvCxnSpPr>
+        <p:spPr>
+          <a:xfrm>
+            <a:off x="1745859" y="587468"/>
+            <a:ext cx="4300" cy="2923219"/>
+          </a:xfrm>
+          <a:prstGeom prst="line">
+            <a:avLst/>
+          </a:prstGeom>
+          <a:ln w="19050">
+            <a:solidFill>
+              <a:schemeClr val="tx1"/>
+            </a:solidFill>
+            <a:prstDash val="sysDot"/>
+          </a:ln>
+          <a:effectLst>
+            <a:glow rad="25400">
+              <a:schemeClr val="bg1"/>
+            </a:glow>
+          </a:effectLst>
+        </p:spPr>
+        <p:style>
+          <a:lnRef idx="1">
+            <a:schemeClr val="accent1"/>
+          </a:lnRef>
+          <a:fillRef idx="0">
+            <a:schemeClr val="accent1"/>
+          </a:fillRef>
+          <a:effectRef idx="0">
+            <a:schemeClr val="accent1"/>
+          </a:effectRef>
+          <a:fontRef idx="minor">
+            <a:schemeClr val="tx1"/>
+          </a:fontRef>
+        </p:style>
+      </p:cxnSp>
+      <p:cxnSp>
+        <p:nvCxnSpPr>
+          <p:cNvPr id="11" name="Straight Connector 10">
+            <a:extLst>
+              <a:ext uri="{FF2B5EF4-FFF2-40B4-BE49-F238E27FC236}">
+                <a16:creationId xmlns:a16="http://schemas.microsoft.com/office/drawing/2014/main" id="{E73CFEB8-0228-4D98-867B-3E6BCEACB4C7}"/>
+              </a:ext>
+            </a:extLst>
+          </p:cNvPr>
+          <p:cNvCxnSpPr>
+            <a:cxnSpLocks/>
+          </p:cNvCxnSpPr>
+          <p:nvPr/>
+        </p:nvCxnSpPr>
+        <p:spPr>
+          <a:xfrm>
+            <a:off x="2491805" y="592489"/>
+            <a:ext cx="4300" cy="2923219"/>
+          </a:xfrm>
+          <a:prstGeom prst="line">
+            <a:avLst/>
+          </a:prstGeom>
+          <a:ln w="19050">
+            <a:solidFill>
+              <a:schemeClr val="tx1"/>
+            </a:solidFill>
+            <a:prstDash val="sysDot"/>
+          </a:ln>
+          <a:effectLst>
+            <a:glow rad="25400">
+              <a:schemeClr val="bg1"/>
+            </a:glow>
+          </a:effectLst>
+        </p:spPr>
+        <p:style>
+          <a:lnRef idx="1">
+            <a:schemeClr val="accent1"/>
+          </a:lnRef>
+          <a:fillRef idx="0">
+            <a:schemeClr val="accent1"/>
+          </a:fillRef>
+          <a:effectRef idx="0">
+            <a:schemeClr val="accent1"/>
+          </a:effectRef>
+          <a:fontRef idx="minor">
+            <a:schemeClr val="tx1"/>
+          </a:fontRef>
+        </p:style>
+      </p:cxnSp>
+      <p:cxnSp>
+        <p:nvCxnSpPr>
+          <p:cNvPr id="12" name="Straight Connector 11">
+            <a:extLst>
+              <a:ext uri="{FF2B5EF4-FFF2-40B4-BE49-F238E27FC236}">
+                <a16:creationId xmlns:a16="http://schemas.microsoft.com/office/drawing/2014/main" id="{B852EBAE-F22F-4157-9345-A8879B203A7F}"/>
+              </a:ext>
+            </a:extLst>
+          </p:cNvPr>
+          <p:cNvCxnSpPr>
+            <a:cxnSpLocks/>
+          </p:cNvCxnSpPr>
+          <p:nvPr/>
+        </p:nvCxnSpPr>
+        <p:spPr>
+          <a:xfrm>
+            <a:off x="3230131" y="587468"/>
+            <a:ext cx="4300" cy="2923219"/>
+          </a:xfrm>
+          <a:prstGeom prst="line">
+            <a:avLst/>
+          </a:prstGeom>
+          <a:ln w="19050">
+            <a:solidFill>
+              <a:schemeClr val="tx1"/>
+            </a:solidFill>
+            <a:prstDash val="sysDot"/>
+          </a:ln>
+          <a:effectLst>
+            <a:glow rad="25400">
+              <a:schemeClr val="bg1"/>
+            </a:glow>
+          </a:effectLst>
+        </p:spPr>
+        <p:style>
+          <a:lnRef idx="1">
+            <a:schemeClr val="accent1"/>
+          </a:lnRef>
+          <a:fillRef idx="0">
+            <a:schemeClr val="accent1"/>
+          </a:fillRef>
+          <a:effectRef idx="0">
+            <a:schemeClr val="accent1"/>
+          </a:effectRef>
+          <a:fontRef idx="minor">
+            <a:schemeClr val="tx1"/>
+          </a:fontRef>
+        </p:style>
+      </p:cxnSp>
+      <p:cxnSp>
+        <p:nvCxnSpPr>
+          <p:cNvPr id="13" name="Straight Connector 12">
+            <a:extLst>
+              <a:ext uri="{FF2B5EF4-FFF2-40B4-BE49-F238E27FC236}">
+                <a16:creationId xmlns:a16="http://schemas.microsoft.com/office/drawing/2014/main" id="{D602A5CC-CFB0-43A0-A67D-6F3C35F6CBFB}"/>
+              </a:ext>
+            </a:extLst>
+          </p:cNvPr>
+          <p:cNvCxnSpPr>
+            <a:cxnSpLocks/>
+          </p:cNvCxnSpPr>
+          <p:nvPr/>
+        </p:nvCxnSpPr>
+        <p:spPr>
+          <a:xfrm>
+            <a:off x="3962007" y="587464"/>
+            <a:ext cx="4300" cy="2923219"/>
+          </a:xfrm>
+          <a:prstGeom prst="line">
+            <a:avLst/>
+          </a:prstGeom>
+          <a:ln w="19050">
+            <a:solidFill>
+              <a:schemeClr val="tx1"/>
+            </a:solidFill>
+            <a:prstDash val="sysDot"/>
+          </a:ln>
+          <a:effectLst>
+            <a:glow rad="25400">
+              <a:schemeClr val="bg1"/>
+            </a:glow>
+          </a:effectLst>
+        </p:spPr>
+        <p:style>
+          <a:lnRef idx="1">
+            <a:schemeClr val="accent1"/>
+          </a:lnRef>
+          <a:fillRef idx="0">
+            <a:schemeClr val="accent1"/>
+          </a:fillRef>
+          <a:effectRef idx="0">
+            <a:schemeClr val="accent1"/>
+          </a:effectRef>
+          <a:fontRef idx="minor">
+            <a:schemeClr val="tx1"/>
+          </a:fontRef>
+        </p:style>
+      </p:cxnSp>
+      <p:cxnSp>
+        <p:nvCxnSpPr>
+          <p:cNvPr id="15" name="Straight Connector 14">
+            <a:extLst>
+              <a:ext uri="{FF2B5EF4-FFF2-40B4-BE49-F238E27FC236}">
+                <a16:creationId xmlns:a16="http://schemas.microsoft.com/office/drawing/2014/main" id="{E71B5488-A6DA-4CCA-A7FC-B5CC9EF751E7}"/>
+              </a:ext>
+            </a:extLst>
+          </p:cNvPr>
+          <p:cNvCxnSpPr>
+            <a:cxnSpLocks/>
+          </p:cNvCxnSpPr>
+          <p:nvPr/>
+        </p:nvCxnSpPr>
+        <p:spPr>
+          <a:xfrm>
+            <a:off x="5446241" y="587460"/>
+            <a:ext cx="4300" cy="2923219"/>
+          </a:xfrm>
+          <a:prstGeom prst="line">
+            <a:avLst/>
+          </a:prstGeom>
+          <a:ln w="19050">
+            <a:solidFill>
+              <a:schemeClr val="tx1"/>
+            </a:solidFill>
+            <a:prstDash val="sysDot"/>
+          </a:ln>
+          <a:effectLst>
+            <a:glow rad="25400">
+              <a:schemeClr val="bg1"/>
+            </a:glow>
+          </a:effectLst>
+        </p:spPr>
+        <p:style>
+          <a:lnRef idx="1">
+            <a:schemeClr val="accent1"/>
+          </a:lnRef>
+          <a:fillRef idx="0">
+            <a:schemeClr val="accent1"/>
+          </a:fillRef>
+          <a:effectRef idx="0">
+            <a:schemeClr val="accent1"/>
+          </a:effectRef>
+          <a:fontRef idx="minor">
+            <a:schemeClr val="tx1"/>
+          </a:fontRef>
+        </p:style>
+      </p:cxnSp>
+      <p:cxnSp>
+        <p:nvCxnSpPr>
+          <p:cNvPr id="16" name="Straight Connector 15">
+            <a:extLst>
+              <a:ext uri="{FF2B5EF4-FFF2-40B4-BE49-F238E27FC236}">
+                <a16:creationId xmlns:a16="http://schemas.microsoft.com/office/drawing/2014/main" id="{CAC51FA1-83BF-413A-BBBC-D10DC4CB93A2}"/>
+              </a:ext>
+            </a:extLst>
+          </p:cNvPr>
+          <p:cNvCxnSpPr>
+            <a:cxnSpLocks/>
+          </p:cNvCxnSpPr>
+          <p:nvPr/>
+        </p:nvCxnSpPr>
+        <p:spPr>
+          <a:xfrm>
+            <a:off x="6179671" y="587461"/>
+            <a:ext cx="4300" cy="2923219"/>
+          </a:xfrm>
+          <a:prstGeom prst="line">
+            <a:avLst/>
+          </a:prstGeom>
+          <a:ln w="19050">
+            <a:solidFill>
+              <a:schemeClr val="tx1"/>
+            </a:solidFill>
+            <a:prstDash val="sysDot"/>
+          </a:ln>
+          <a:effectLst>
+            <a:glow rad="25400">
+              <a:schemeClr val="bg1"/>
+            </a:glow>
+          </a:effectLst>
+        </p:spPr>
+        <p:style>
+          <a:lnRef idx="1">
+            <a:schemeClr val="accent1"/>
+          </a:lnRef>
+          <a:fillRef idx="0">
+            <a:schemeClr val="accent1"/>
+          </a:fillRef>
+          <a:effectRef idx="0">
+            <a:schemeClr val="accent1"/>
+          </a:effectRef>
+          <a:fontRef idx="minor">
+            <a:schemeClr val="tx1"/>
+          </a:fontRef>
+        </p:style>
+      </p:cxnSp>
+      <p:cxnSp>
+        <p:nvCxnSpPr>
+          <p:cNvPr id="17" name="Straight Connector 16">
+            <a:extLst>
+              <a:ext uri="{FF2B5EF4-FFF2-40B4-BE49-F238E27FC236}">
+                <a16:creationId xmlns:a16="http://schemas.microsoft.com/office/drawing/2014/main" id="{43378872-A0BF-4425-B93E-9D95A2F824F2}"/>
+              </a:ext>
+            </a:extLst>
+          </p:cNvPr>
+          <p:cNvCxnSpPr>
+            <a:cxnSpLocks/>
+          </p:cNvCxnSpPr>
+          <p:nvPr/>
+        </p:nvCxnSpPr>
+        <p:spPr>
+          <a:xfrm>
+            <a:off x="6926004" y="587464"/>
+            <a:ext cx="4300" cy="2923219"/>
+          </a:xfrm>
+          <a:prstGeom prst="line">
+            <a:avLst/>
+          </a:prstGeom>
+          <a:ln w="19050">
+            <a:solidFill>
+              <a:schemeClr val="tx1"/>
+            </a:solidFill>
+            <a:prstDash val="sysDot"/>
+          </a:ln>
+          <a:effectLst>
+            <a:glow rad="25400">
+              <a:schemeClr val="bg1"/>
+            </a:glow>
+          </a:effectLst>
+        </p:spPr>
+        <p:style>
+          <a:lnRef idx="1">
+            <a:schemeClr val="accent1"/>
+          </a:lnRef>
+          <a:fillRef idx="0">
+            <a:schemeClr val="accent1"/>
+          </a:fillRef>
+          <a:effectRef idx="0">
+            <a:schemeClr val="accent1"/>
+          </a:effectRef>
+          <a:fontRef idx="minor">
+            <a:schemeClr val="tx1"/>
+          </a:fontRef>
+        </p:style>
+      </p:cxnSp>
+      <p:cxnSp>
+        <p:nvCxnSpPr>
+          <p:cNvPr id="18" name="Straight Connector 17">
+            <a:extLst>
+              <a:ext uri="{FF2B5EF4-FFF2-40B4-BE49-F238E27FC236}">
+                <a16:creationId xmlns:a16="http://schemas.microsoft.com/office/drawing/2014/main" id="{8FE533CE-C8D2-4134-9A77-8537723C12CA}"/>
+              </a:ext>
+            </a:extLst>
+          </p:cNvPr>
+          <p:cNvCxnSpPr>
+            <a:cxnSpLocks/>
+          </p:cNvCxnSpPr>
+          <p:nvPr/>
+        </p:nvCxnSpPr>
+        <p:spPr>
+          <a:xfrm>
+            <a:off x="7661525" y="604160"/>
+            <a:ext cx="4300" cy="2923219"/>
+          </a:xfrm>
+          <a:prstGeom prst="line">
+            <a:avLst/>
+          </a:prstGeom>
+          <a:ln w="19050">
+            <a:solidFill>
+              <a:schemeClr val="tx1"/>
+            </a:solidFill>
+            <a:prstDash val="sysDot"/>
+          </a:ln>
+          <a:effectLst>
+            <a:glow rad="25400">
+              <a:schemeClr val="bg1"/>
+            </a:glow>
+          </a:effectLst>
+        </p:spPr>
+        <p:style>
+          <a:lnRef idx="1">
+            <a:schemeClr val="accent1"/>
+          </a:lnRef>
+          <a:fillRef idx="0">
+            <a:schemeClr val="accent1"/>
+          </a:fillRef>
+          <a:effectRef idx="0">
+            <a:schemeClr val="accent1"/>
+          </a:effectRef>
+          <a:fontRef idx="minor">
+            <a:schemeClr val="tx1"/>
+          </a:fontRef>
+        </p:style>
+      </p:cxnSp>
+      <p:cxnSp>
+        <p:nvCxnSpPr>
+          <p:cNvPr id="19" name="Straight Arrow Connector 18">
+            <a:extLst>
+              <a:ext uri="{FF2B5EF4-FFF2-40B4-BE49-F238E27FC236}">
+                <a16:creationId xmlns:a16="http://schemas.microsoft.com/office/drawing/2014/main" id="{63C09208-9C93-4AC8-8C52-25CE79DD565C}"/>
+              </a:ext>
+            </a:extLst>
+          </p:cNvPr>
+          <p:cNvCxnSpPr>
+            <a:cxnSpLocks/>
+          </p:cNvCxnSpPr>
+          <p:nvPr/>
+        </p:nvCxnSpPr>
+        <p:spPr>
+          <a:xfrm>
+            <a:off x="1030393" y="842654"/>
+            <a:ext cx="723086" cy="0"/>
+          </a:xfrm>
+          <a:prstGeom prst="straightConnector1">
+            <a:avLst/>
+          </a:prstGeom>
+          <a:ln>
+            <a:solidFill>
+              <a:schemeClr val="tx1"/>
+            </a:solidFill>
+            <a:headEnd type="triangle"/>
+            <a:tailEnd type="triangle"/>
+          </a:ln>
+        </p:spPr>
+        <p:style>
+          <a:lnRef idx="1">
+            <a:schemeClr val="accent1"/>
+          </a:lnRef>
+          <a:fillRef idx="0">
+            <a:schemeClr val="accent1"/>
+          </a:fillRef>
+          <a:effectRef idx="0">
+            <a:schemeClr val="accent1"/>
+          </a:effectRef>
+          <a:fontRef idx="minor">
+            <a:schemeClr val="tx1"/>
+          </a:fontRef>
+        </p:style>
+      </p:cxnSp>
+      <p:cxnSp>
+        <p:nvCxnSpPr>
+          <p:cNvPr id="21" name="Straight Connector 20">
+            <a:extLst>
+              <a:ext uri="{FF2B5EF4-FFF2-40B4-BE49-F238E27FC236}">
+                <a16:creationId xmlns:a16="http://schemas.microsoft.com/office/drawing/2014/main" id="{C5439A74-2E64-4906-93C6-72D16ED81439}"/>
+              </a:ext>
+            </a:extLst>
+          </p:cNvPr>
+          <p:cNvCxnSpPr>
+            <a:cxnSpLocks/>
+          </p:cNvCxnSpPr>
+          <p:nvPr/>
+        </p:nvCxnSpPr>
+        <p:spPr>
+          <a:xfrm>
+            <a:off x="1030393" y="595083"/>
+            <a:ext cx="4300" cy="2923219"/>
+          </a:xfrm>
+          <a:prstGeom prst="line">
+            <a:avLst/>
+          </a:prstGeom>
+          <a:ln w="19050">
+            <a:solidFill>
+              <a:schemeClr val="tx1"/>
+            </a:solidFill>
+            <a:prstDash val="sysDot"/>
+          </a:ln>
+          <a:effectLst>
+            <a:glow rad="25400">
+              <a:schemeClr val="bg1"/>
+            </a:glow>
+          </a:effectLst>
+        </p:spPr>
+        <p:style>
+          <a:lnRef idx="1">
+            <a:schemeClr val="accent1"/>
+          </a:lnRef>
+          <a:fillRef idx="0">
+            <a:schemeClr val="accent1"/>
+          </a:fillRef>
+          <a:effectRef idx="0">
+            <a:schemeClr val="accent1"/>
+          </a:effectRef>
+          <a:fontRef idx="minor">
+            <a:schemeClr val="tx1"/>
+          </a:fontRef>
+        </p:style>
+      </p:cxnSp>
+      <mc:AlternateContent xmlns:mc="http://schemas.openxmlformats.org/markup-compatibility/2006" xmlns:a14="http://schemas.microsoft.com/office/drawing/2010/main">
+        <mc:Choice Requires="a14">
+          <p:sp>
+            <p:nvSpPr>
+              <p:cNvPr id="22" name="TextBox 21">
+                <a:extLst>
+                  <a:ext uri="{FF2B5EF4-FFF2-40B4-BE49-F238E27FC236}">
+                    <a16:creationId xmlns:a16="http://schemas.microsoft.com/office/drawing/2014/main" id="{8C8C2C0F-5087-41FB-BF7B-DDD976066440}"/>
+                  </a:ext>
+                </a:extLst>
+              </p:cNvPr>
+              <p:cNvSpPr txBox="1"/>
+              <p:nvPr/>
+            </p:nvSpPr>
+            <p:spPr>
+              <a:xfrm rot="16200000">
+                <a:off x="-499372" y="1966279"/>
+                <a:ext cx="1637198" cy="434478"/>
+              </a:xfrm>
+              <a:prstGeom prst="rect">
+                <a:avLst/>
+              </a:prstGeom>
+              <a:noFill/>
+            </p:spPr>
+            <p:txBody>
+              <a:bodyPr wrap="square" rtlCol="0">
+                <a:spAutoFit/>
+              </a:bodyPr>
+              <a:lstStyle/>
+              <a:p>
+                <a14:m>
+                  <m:oMath xmlns:m="http://schemas.openxmlformats.org/officeDocument/2006/math">
+                    <m:sSub>
+                      <m:sSubPr>
+                        <m:ctrlPr>
+                          <a:rPr lang="en-US" b="0" i="1" smtClean="0">
+                            <a:latin typeface="Cambria Math" panose="02040503050406030204" pitchFamily="18" charset="0"/>
+                            <a:cs typeface="Times New Roman" panose="02020603050405020304" pitchFamily="18" charset="0"/>
+                          </a:rPr>
+                        </m:ctrlPr>
+                      </m:sSubPr>
+                      <m:e>
+                        <m:r>
+                          <a:rPr lang="en-US" b="0" i="1" smtClean="0">
+                            <a:latin typeface="Cambria Math" panose="02040503050406030204" pitchFamily="18" charset="0"/>
+                            <a:cs typeface="Times New Roman" panose="02020603050405020304" pitchFamily="18" charset="0"/>
+                          </a:rPr>
+                          <m:t>𝑈</m:t>
+                        </m:r>
+                      </m:e>
+                      <m:sub>
+                        <m:r>
+                          <a:rPr lang="en-US" b="0" i="1" smtClean="0">
+                            <a:latin typeface="Cambria Math" panose="02040503050406030204" pitchFamily="18" charset="0"/>
+                            <a:cs typeface="Times New Roman" panose="02020603050405020304" pitchFamily="18" charset="0"/>
+                          </a:rPr>
+                          <m:t>𝑖</m:t>
+                        </m:r>
+                      </m:sub>
+                    </m:sSub>
+                    <m:r>
+                      <a:rPr lang="en-US" b="0" i="1" smtClean="0">
+                        <a:latin typeface="Cambria Math" panose="02040503050406030204" pitchFamily="18" charset="0"/>
+                        <a:cs typeface="Times New Roman" panose="02020603050405020304" pitchFamily="18" charset="0"/>
+                      </a:rPr>
+                      <m:t> / </m:t>
+                    </m:r>
+                    <m:sSubSup>
+                      <m:sSubSupPr>
+                        <m:ctrlPr>
+                          <a:rPr lang="en-US" b="0" i="1" smtClean="0">
+                            <a:latin typeface="Cambria Math" panose="02040503050406030204" pitchFamily="18" charset="0"/>
+                            <a:cs typeface="Times New Roman" panose="02020603050405020304" pitchFamily="18" charset="0"/>
+                          </a:rPr>
+                        </m:ctrlPr>
+                      </m:sSubSupPr>
+                      <m:e>
+                        <m:r>
+                          <a:rPr lang="en-US" b="0" i="1" smtClean="0">
+                            <a:latin typeface="Cambria Math" panose="02040503050406030204" pitchFamily="18" charset="0"/>
+                            <a:cs typeface="Times New Roman" panose="02020603050405020304" pitchFamily="18" charset="0"/>
+                          </a:rPr>
+                          <m:t>𝑈</m:t>
+                        </m:r>
+                      </m:e>
+                      <m:sub>
+                        <m:r>
+                          <a:rPr lang="en-US" b="0" i="1" smtClean="0">
+                            <a:latin typeface="Cambria Math" panose="02040503050406030204" pitchFamily="18" charset="0"/>
+                            <a:cs typeface="Times New Roman" panose="02020603050405020304" pitchFamily="18" charset="0"/>
+                          </a:rPr>
+                          <m:t>𝑖</m:t>
+                        </m:r>
+                      </m:sub>
+                      <m:sup>
+                        <m:r>
+                          <a:rPr lang="en-US" b="0" i="1" smtClean="0">
+                            <a:latin typeface="Cambria Math" panose="02040503050406030204" pitchFamily="18" charset="0"/>
+                            <a:cs typeface="Times New Roman" panose="02020603050405020304" pitchFamily="18" charset="0"/>
+                          </a:rPr>
+                          <m:t>𝑓</m:t>
+                        </m:r>
+                      </m:sup>
+                    </m:sSubSup>
+                    <m:r>
+                      <a:rPr lang="en-US" b="0" i="1" smtClean="0">
+                        <a:latin typeface="Cambria Math" panose="02040503050406030204" pitchFamily="18" charset="0"/>
+                        <a:cs typeface="Times New Roman" panose="02020603050405020304" pitchFamily="18" charset="0"/>
+                      </a:rPr>
+                      <m:t> </m:t>
+                    </m:r>
+                  </m:oMath>
+                </a14:m>
+                <a:r>
+                  <a:rPr lang="en-US" dirty="0">
+                    <a:latin typeface="Times New Roman" panose="02020603050405020304" pitchFamily="18" charset="0"/>
+                    <a:cs typeface="Times New Roman" panose="02020603050405020304" pitchFamily="18" charset="0"/>
+                  </a:rPr>
+                  <a:t>(</a:t>
+                </a:r>
+                <a:r>
+                  <a:rPr lang="en-US" dirty="0" err="1">
+                    <a:latin typeface="Times New Roman" panose="02020603050405020304" pitchFamily="18" charset="0"/>
+                    <a:cs typeface="Times New Roman" panose="02020603050405020304" pitchFamily="18" charset="0"/>
+                  </a:rPr>
+                  <a:t>p.u</a:t>
+                </a:r>
+                <a:r>
+                  <a:rPr lang="en-US" dirty="0">
+                    <a:latin typeface="Times New Roman" panose="02020603050405020304" pitchFamily="18" charset="0"/>
+                    <a:cs typeface="Times New Roman" panose="02020603050405020304" pitchFamily="18" charset="0"/>
+                  </a:rPr>
+                  <a:t>)</a:t>
+                </a:r>
+              </a:p>
+            </p:txBody>
+          </p:sp>
+        </mc:Choice>
+        <mc:Fallback xmlns="">
+          <p:sp>
+            <p:nvSpPr>
+              <p:cNvPr id="22" name="TextBox 21">
+                <a:extLst>
+                  <a:ext uri="{FF2B5EF4-FFF2-40B4-BE49-F238E27FC236}">
+                    <a16:creationId xmlns:a16="http://schemas.microsoft.com/office/drawing/2014/main" id="{8C8C2C0F-5087-41FB-BF7B-DDD976066440}"/>
+                  </a:ext>
+                </a:extLst>
+              </p:cNvPr>
+              <p:cNvSpPr txBox="1">
+                <a:spLocks noRot="1" noChangeAspect="1" noMove="1" noResize="1" noEditPoints="1" noAdjustHandles="1" noChangeArrowheads="1" noChangeShapeType="1" noTextEdit="1"/>
+              </p:cNvSpPr>
+              <p:nvPr/>
+            </p:nvSpPr>
+            <p:spPr>
+              <a:xfrm rot="16200000">
+                <a:off x="-499372" y="1966279"/>
+                <a:ext cx="1637198" cy="434478"/>
+              </a:xfrm>
+              <a:prstGeom prst="rect">
+                <a:avLst/>
+              </a:prstGeom>
+              <a:blipFill>
+                <a:blip r:embed="rId3"/>
+                <a:stretch>
+                  <a:fillRect r="-18310"/>
+                </a:stretch>
+              </a:blipFill>
+            </p:spPr>
+            <p:txBody>
+              <a:bodyPr/>
+              <a:lstStyle/>
+              <a:p>
+                <a:r>
+                  <a:rPr lang="en-US">
+                    <a:noFill/>
+                  </a:rPr>
+                  <a:t> </a:t>
+                </a:r>
+              </a:p>
+            </p:txBody>
+          </p:sp>
+        </mc:Fallback>
+      </mc:AlternateContent>
+      <mc:AlternateContent xmlns:mc="http://schemas.openxmlformats.org/markup-compatibility/2006" xmlns:a14="http://schemas.microsoft.com/office/drawing/2010/main">
+        <mc:Choice Requires="a14">
+          <p:sp>
+            <p:nvSpPr>
+              <p:cNvPr id="23" name="TextBox 22">
+                <a:extLst>
+                  <a:ext uri="{FF2B5EF4-FFF2-40B4-BE49-F238E27FC236}">
+                    <a16:creationId xmlns:a16="http://schemas.microsoft.com/office/drawing/2014/main" id="{40F8A22D-A70A-4171-9E19-A9B5A99BD0C5}"/>
+                  </a:ext>
+                </a:extLst>
+              </p:cNvPr>
+              <p:cNvSpPr txBox="1"/>
+              <p:nvPr/>
+            </p:nvSpPr>
+            <p:spPr>
+              <a:xfrm>
+                <a:off x="1169338" y="1158649"/>
+                <a:ext cx="442857" cy="323165"/>
+              </a:xfrm>
+              <a:prstGeom prst="rect">
+                <a:avLst/>
+              </a:prstGeom>
+              <a:solidFill>
+                <a:schemeClr val="bg1"/>
+              </a:solidFill>
+            </p:spPr>
+            <p:txBody>
+              <a:bodyPr wrap="square" rtlCol="0">
+                <a:spAutoFit/>
+              </a:bodyPr>
+              <a:lstStyle/>
+              <a:p>
+                <a:pPr algn="ctr"/>
+                <a14:m>
+                  <m:oMathPara xmlns:m="http://schemas.openxmlformats.org/officeDocument/2006/math">
+                    <m:oMathParaPr>
+                      <m:jc m:val="centerGroup"/>
+                    </m:oMathParaPr>
+                    <m:oMath xmlns:m="http://schemas.openxmlformats.org/officeDocument/2006/math">
+                      <m:sSub>
+                        <m:sSubPr>
+                          <m:ctrlPr>
+                            <a:rPr lang="en-US" sz="1500" b="0" i="1" dirty="0" smtClean="0">
+                              <a:solidFill>
+                                <a:srgbClr val="002060"/>
+                              </a:solidFill>
+                              <a:latin typeface="Cambria Math" panose="02040503050406030204" pitchFamily="18" charset="0"/>
+                            </a:rPr>
+                          </m:ctrlPr>
+                        </m:sSubPr>
+                        <m:e>
+                          <m:r>
+                            <a:rPr lang="en-US" sz="1500" b="0" i="1" dirty="0" smtClean="0">
+                              <a:solidFill>
+                                <a:srgbClr val="002060"/>
+                              </a:solidFill>
+                              <a:latin typeface="Cambria Math" panose="02040503050406030204" pitchFamily="18" charset="0"/>
+                            </a:rPr>
+                            <m:t>𝑈</m:t>
+                          </m:r>
+                        </m:e>
+                        <m:sub>
+                          <m:r>
+                            <a:rPr lang="en-US" sz="1500" b="0" i="1" dirty="0" smtClean="0">
+                              <a:solidFill>
+                                <a:srgbClr val="002060"/>
+                              </a:solidFill>
+                              <a:latin typeface="Cambria Math" panose="02040503050406030204" pitchFamily="18" charset="0"/>
+                            </a:rPr>
+                            <m:t>𝑖</m:t>
+                          </m:r>
+                        </m:sub>
+                      </m:sSub>
+                    </m:oMath>
+                  </m:oMathPara>
+                </a14:m>
+                <a:endParaRPr lang="en-US" sz="1500" b="0" dirty="0"/>
+              </a:p>
+            </p:txBody>
+          </p:sp>
+        </mc:Choice>
+        <mc:Fallback xmlns="">
+          <p:sp>
+            <p:nvSpPr>
+              <p:cNvPr id="23" name="TextBox 22">
+                <a:extLst>
+                  <a:ext uri="{FF2B5EF4-FFF2-40B4-BE49-F238E27FC236}">
+                    <a16:creationId xmlns:a16="http://schemas.microsoft.com/office/drawing/2014/main" id="{40F8A22D-A70A-4171-9E19-A9B5A99BD0C5}"/>
+                  </a:ext>
+                </a:extLst>
+              </p:cNvPr>
+              <p:cNvSpPr txBox="1">
+                <a:spLocks noRot="1" noChangeAspect="1" noMove="1" noResize="1" noEditPoints="1" noAdjustHandles="1" noChangeArrowheads="1" noChangeShapeType="1" noTextEdit="1"/>
+              </p:cNvSpPr>
+              <p:nvPr/>
+            </p:nvSpPr>
+            <p:spPr>
+              <a:xfrm>
+                <a:off x="1169338" y="1158649"/>
+                <a:ext cx="442857" cy="323165"/>
+              </a:xfrm>
+              <a:prstGeom prst="rect">
+                <a:avLst/>
+              </a:prstGeom>
+              <a:blipFill>
+                <a:blip r:embed="rId4"/>
+                <a:stretch>
+                  <a:fillRect/>
+                </a:stretch>
+              </a:blipFill>
+            </p:spPr>
+            <p:txBody>
+              <a:bodyPr/>
+              <a:lstStyle/>
+              <a:p>
+                <a:r>
+                  <a:rPr lang="en-US">
+                    <a:noFill/>
+                  </a:rPr>
+                  <a:t> </a:t>
+                </a:r>
+              </a:p>
+            </p:txBody>
+          </p:sp>
+        </mc:Fallback>
+      </mc:AlternateContent>
+      <p:cxnSp>
+        <p:nvCxnSpPr>
+          <p:cNvPr id="24" name="Straight Arrow Connector 23">
+            <a:extLst>
+              <a:ext uri="{FF2B5EF4-FFF2-40B4-BE49-F238E27FC236}">
+                <a16:creationId xmlns:a16="http://schemas.microsoft.com/office/drawing/2014/main" id="{63D637D9-2E3E-47D8-B15C-C77F66981775}"/>
+              </a:ext>
+            </a:extLst>
+          </p:cNvPr>
+          <p:cNvCxnSpPr>
+            <a:cxnSpLocks/>
+          </p:cNvCxnSpPr>
+          <p:nvPr/>
+        </p:nvCxnSpPr>
+        <p:spPr>
+          <a:xfrm>
+            <a:off x="1626861" y="1320070"/>
+            <a:ext cx="442857" cy="0"/>
+          </a:xfrm>
+          <a:prstGeom prst="straightConnector1">
+            <a:avLst/>
+          </a:prstGeom>
+          <a:ln w="25400">
+            <a:solidFill>
+              <a:srgbClr val="002060"/>
+            </a:solidFill>
+            <a:headEnd type="none"/>
+            <a:tailEnd type="triangle"/>
+          </a:ln>
+          <a:effectLst>
+            <a:glow rad="25400">
+              <a:schemeClr val="bg1"/>
+            </a:glow>
+          </a:effectLst>
+        </p:spPr>
+        <p:style>
+          <a:lnRef idx="1">
+            <a:schemeClr val="accent1"/>
+          </a:lnRef>
+          <a:fillRef idx="0">
+            <a:schemeClr val="accent1"/>
+          </a:fillRef>
+          <a:effectRef idx="0">
+            <a:schemeClr val="accent1"/>
+          </a:effectRef>
+          <a:fontRef idx="minor">
+            <a:schemeClr val="tx1"/>
+          </a:fontRef>
+        </p:style>
+      </p:cxnSp>
+      <mc:AlternateContent xmlns:mc="http://schemas.openxmlformats.org/markup-compatibility/2006" xmlns:a14="http://schemas.microsoft.com/office/drawing/2010/main">
+        <mc:Choice Requires="a14">
+          <p:sp>
+            <p:nvSpPr>
+              <p:cNvPr id="25" name="TextBox 24">
+                <a:extLst>
+                  <a:ext uri="{FF2B5EF4-FFF2-40B4-BE49-F238E27FC236}">
+                    <a16:creationId xmlns:a16="http://schemas.microsoft.com/office/drawing/2014/main" id="{41DFAC13-B64B-4E1C-BD04-A2E2F7A487EF}"/>
+                  </a:ext>
+                </a:extLst>
+              </p:cNvPr>
+              <p:cNvSpPr txBox="1"/>
+              <p:nvPr/>
+            </p:nvSpPr>
+            <p:spPr>
+              <a:xfrm>
+                <a:off x="1190219" y="2073390"/>
+                <a:ext cx="442857" cy="384144"/>
+              </a:xfrm>
+              <a:prstGeom prst="rect">
+                <a:avLst/>
+              </a:prstGeom>
+              <a:solidFill>
+                <a:schemeClr val="bg1"/>
+              </a:solidFill>
+            </p:spPr>
+            <p:txBody>
+              <a:bodyPr wrap="square" rtlCol="0">
+                <a:spAutoFit/>
+              </a:bodyPr>
+              <a:lstStyle/>
+              <a:p>
+                <a:pPr algn="ctr"/>
+                <a14:m>
+                  <m:oMathPara xmlns:m="http://schemas.openxmlformats.org/officeDocument/2006/math">
+                    <m:oMathParaPr>
+                      <m:jc m:val="centerGroup"/>
+                    </m:oMathParaPr>
+                    <m:oMath xmlns:m="http://schemas.openxmlformats.org/officeDocument/2006/math">
+                      <m:sSubSup>
+                        <m:sSubSupPr>
+                          <m:ctrlPr>
+                            <a:rPr lang="en-US" sz="1500" i="1" dirty="0" smtClean="0">
+                              <a:solidFill>
+                                <a:srgbClr val="49A7A7"/>
+                              </a:solidFill>
+                              <a:latin typeface="Cambria Math" panose="02040503050406030204" pitchFamily="18" charset="0"/>
+                            </a:rPr>
+                          </m:ctrlPr>
+                        </m:sSubSupPr>
+                        <m:e>
+                          <m:r>
+                            <a:rPr lang="en-US" sz="1500" b="0" i="1" dirty="0" smtClean="0">
+                              <a:solidFill>
+                                <a:srgbClr val="49A7A7"/>
+                              </a:solidFill>
+                              <a:latin typeface="Cambria Math" panose="02040503050406030204" pitchFamily="18" charset="0"/>
+                            </a:rPr>
+                            <m:t>𝑈</m:t>
+                          </m:r>
+                        </m:e>
+                        <m:sub>
+                          <m:r>
+                            <a:rPr lang="en-US" sz="1500" b="0" i="1" dirty="0" smtClean="0">
+                              <a:solidFill>
+                                <a:srgbClr val="49A7A7"/>
+                              </a:solidFill>
+                              <a:latin typeface="Cambria Math" panose="02040503050406030204" pitchFamily="18" charset="0"/>
+                            </a:rPr>
+                            <m:t>𝑖</m:t>
+                          </m:r>
+                        </m:sub>
+                        <m:sup>
+                          <m:r>
+                            <a:rPr lang="en-US" sz="1500" b="0" i="1" dirty="0" smtClean="0">
+                              <a:solidFill>
+                                <a:srgbClr val="49A7A7"/>
+                              </a:solidFill>
+                              <a:latin typeface="Cambria Math" panose="02040503050406030204" pitchFamily="18" charset="0"/>
+                            </a:rPr>
+                            <m:t>𝑓</m:t>
+                          </m:r>
+                        </m:sup>
+                      </m:sSubSup>
+                    </m:oMath>
+                  </m:oMathPara>
+                </a14:m>
+                <a:endParaRPr lang="en-US" sz="1500" dirty="0"/>
+              </a:p>
+            </p:txBody>
+          </p:sp>
+        </mc:Choice>
+        <mc:Fallback xmlns="">
+          <p:sp>
+            <p:nvSpPr>
+              <p:cNvPr id="25" name="TextBox 24">
+                <a:extLst>
+                  <a:ext uri="{FF2B5EF4-FFF2-40B4-BE49-F238E27FC236}">
+                    <a16:creationId xmlns:a16="http://schemas.microsoft.com/office/drawing/2014/main" id="{41DFAC13-B64B-4E1C-BD04-A2E2F7A487EF}"/>
+                  </a:ext>
+                </a:extLst>
+              </p:cNvPr>
+              <p:cNvSpPr txBox="1">
+                <a:spLocks noRot="1" noChangeAspect="1" noMove="1" noResize="1" noEditPoints="1" noAdjustHandles="1" noChangeArrowheads="1" noChangeShapeType="1" noTextEdit="1"/>
+              </p:cNvSpPr>
+              <p:nvPr/>
+            </p:nvSpPr>
+            <p:spPr>
+              <a:xfrm>
+                <a:off x="1190219" y="2073390"/>
+                <a:ext cx="442857" cy="384144"/>
+              </a:xfrm>
+              <a:prstGeom prst="rect">
+                <a:avLst/>
+              </a:prstGeom>
+              <a:blipFill>
+                <a:blip r:embed="rId5"/>
+                <a:stretch>
+                  <a:fillRect/>
+                </a:stretch>
+              </a:blipFill>
+            </p:spPr>
+            <p:txBody>
+              <a:bodyPr/>
+              <a:lstStyle/>
+              <a:p>
+                <a:r>
+                  <a:rPr lang="en-US">
+                    <a:noFill/>
+                  </a:rPr>
+                  <a:t> </a:t>
+                </a:r>
+              </a:p>
+            </p:txBody>
+          </p:sp>
+        </mc:Fallback>
+      </mc:AlternateContent>
+      <p:cxnSp>
+        <p:nvCxnSpPr>
+          <p:cNvPr id="26" name="Straight Arrow Connector 25">
+            <a:extLst>
+              <a:ext uri="{FF2B5EF4-FFF2-40B4-BE49-F238E27FC236}">
+                <a16:creationId xmlns:a16="http://schemas.microsoft.com/office/drawing/2014/main" id="{406436D6-0730-4A55-AD6B-AF2B09884524}"/>
+              </a:ext>
+            </a:extLst>
+          </p:cNvPr>
+          <p:cNvCxnSpPr>
+            <a:cxnSpLocks/>
+          </p:cNvCxnSpPr>
+          <p:nvPr/>
+        </p:nvCxnSpPr>
+        <p:spPr>
+          <a:xfrm flipV="1">
+            <a:off x="1638901" y="2257925"/>
+            <a:ext cx="442857" cy="162"/>
+          </a:xfrm>
+          <a:prstGeom prst="straightConnector1">
+            <a:avLst/>
+          </a:prstGeom>
+          <a:ln w="25400">
+            <a:solidFill>
+              <a:srgbClr val="49A7A7"/>
+            </a:solidFill>
+            <a:headEnd type="none"/>
+            <a:tailEnd type="triangle"/>
+          </a:ln>
+          <a:effectLst>
+            <a:glow rad="25400">
+              <a:schemeClr val="bg1"/>
+            </a:glow>
+          </a:effectLst>
+        </p:spPr>
+        <p:style>
+          <a:lnRef idx="1">
+            <a:schemeClr val="accent1"/>
+          </a:lnRef>
+          <a:fillRef idx="0">
+            <a:schemeClr val="accent1"/>
+          </a:fillRef>
+          <a:effectRef idx="0">
+            <a:schemeClr val="accent1"/>
+          </a:effectRef>
+          <a:fontRef idx="minor">
+            <a:schemeClr val="tx1"/>
+          </a:fontRef>
+        </p:style>
+      </p:cxnSp>
+      <p:cxnSp>
+        <p:nvCxnSpPr>
+          <p:cNvPr id="36" name="Straight Connector 35">
+            <a:extLst>
+              <a:ext uri="{FF2B5EF4-FFF2-40B4-BE49-F238E27FC236}">
+                <a16:creationId xmlns:a16="http://schemas.microsoft.com/office/drawing/2014/main" id="{34D89468-3C90-4474-84F4-1F4C4A12E238}"/>
+              </a:ext>
+            </a:extLst>
+          </p:cNvPr>
+          <p:cNvCxnSpPr>
+            <a:cxnSpLocks/>
+          </p:cNvCxnSpPr>
+          <p:nvPr/>
+        </p:nvCxnSpPr>
+        <p:spPr>
+          <a:xfrm>
+            <a:off x="8395551" y="612461"/>
+            <a:ext cx="4300" cy="2923219"/>
+          </a:xfrm>
+          <a:prstGeom prst="line">
+            <a:avLst/>
+          </a:prstGeom>
+          <a:ln w="19050">
+            <a:solidFill>
+              <a:schemeClr val="tx1"/>
+            </a:solidFill>
+            <a:prstDash val="sysDot"/>
+          </a:ln>
+          <a:effectLst>
+            <a:glow rad="25400">
+              <a:schemeClr val="bg1"/>
+            </a:glow>
+          </a:effectLst>
+        </p:spPr>
+        <p:style>
+          <a:lnRef idx="1">
+            <a:schemeClr val="accent1"/>
+          </a:lnRef>
+          <a:fillRef idx="0">
+            <a:schemeClr val="accent1"/>
+          </a:fillRef>
+          <a:effectRef idx="0">
+            <a:schemeClr val="accent1"/>
+          </a:effectRef>
+          <a:fontRef idx="minor">
+            <a:schemeClr val="tx1"/>
+          </a:fontRef>
+        </p:style>
+      </p:cxnSp>
+      <p:cxnSp>
+        <p:nvCxnSpPr>
+          <p:cNvPr id="44" name="Straight Arrow Connector 43">
+            <a:extLst>
+              <a:ext uri="{FF2B5EF4-FFF2-40B4-BE49-F238E27FC236}">
+                <a16:creationId xmlns:a16="http://schemas.microsoft.com/office/drawing/2014/main" id="{0AA8C5F0-C822-402B-8BDE-6F88C65C1D3A}"/>
+              </a:ext>
+            </a:extLst>
+          </p:cNvPr>
+          <p:cNvCxnSpPr>
+            <a:cxnSpLocks/>
+          </p:cNvCxnSpPr>
+          <p:nvPr/>
+        </p:nvCxnSpPr>
+        <p:spPr>
+          <a:xfrm>
+            <a:off x="1759601" y="842654"/>
+            <a:ext cx="723086" cy="0"/>
+          </a:xfrm>
+          <a:prstGeom prst="straightConnector1">
+            <a:avLst/>
+          </a:prstGeom>
+          <a:ln>
+            <a:solidFill>
+              <a:schemeClr val="tx1"/>
+            </a:solidFill>
+            <a:headEnd type="triangle"/>
+            <a:tailEnd type="triangle"/>
+          </a:ln>
+        </p:spPr>
+        <p:style>
+          <a:lnRef idx="1">
+            <a:schemeClr val="accent1"/>
+          </a:lnRef>
+          <a:fillRef idx="0">
+            <a:schemeClr val="accent1"/>
+          </a:fillRef>
+          <a:effectRef idx="0">
+            <a:schemeClr val="accent1"/>
+          </a:effectRef>
+          <a:fontRef idx="minor">
+            <a:schemeClr val="tx1"/>
+          </a:fontRef>
+        </p:style>
+      </p:cxnSp>
+      <p:cxnSp>
+        <p:nvCxnSpPr>
+          <p:cNvPr id="45" name="Straight Arrow Connector 44">
+            <a:extLst>
+              <a:ext uri="{FF2B5EF4-FFF2-40B4-BE49-F238E27FC236}">
+                <a16:creationId xmlns:a16="http://schemas.microsoft.com/office/drawing/2014/main" id="{913F8DF1-0E75-47FC-BCDE-C2AD3152ACBF}"/>
+              </a:ext>
+            </a:extLst>
+          </p:cNvPr>
+          <p:cNvCxnSpPr>
+            <a:cxnSpLocks/>
+          </p:cNvCxnSpPr>
+          <p:nvPr/>
+        </p:nvCxnSpPr>
+        <p:spPr>
+          <a:xfrm>
+            <a:off x="2491805" y="842654"/>
+            <a:ext cx="723086" cy="0"/>
+          </a:xfrm>
+          <a:prstGeom prst="straightConnector1">
+            <a:avLst/>
+          </a:prstGeom>
+          <a:ln>
+            <a:solidFill>
+              <a:schemeClr val="tx1"/>
+            </a:solidFill>
+            <a:headEnd type="triangle"/>
+            <a:tailEnd type="triangle"/>
+          </a:ln>
+        </p:spPr>
+        <p:style>
+          <a:lnRef idx="1">
+            <a:schemeClr val="accent1"/>
+          </a:lnRef>
+          <a:fillRef idx="0">
+            <a:schemeClr val="accent1"/>
+          </a:fillRef>
+          <a:effectRef idx="0">
+            <a:schemeClr val="accent1"/>
+          </a:effectRef>
+          <a:fontRef idx="minor">
+            <a:schemeClr val="tx1"/>
+          </a:fontRef>
+        </p:style>
+      </p:cxnSp>
+      <p:cxnSp>
+        <p:nvCxnSpPr>
+          <p:cNvPr id="46" name="Straight Arrow Connector 45">
+            <a:extLst>
+              <a:ext uri="{FF2B5EF4-FFF2-40B4-BE49-F238E27FC236}">
+                <a16:creationId xmlns:a16="http://schemas.microsoft.com/office/drawing/2014/main" id="{964DE42C-EC57-4FAC-8951-66454667DCC3}"/>
+              </a:ext>
+            </a:extLst>
+          </p:cNvPr>
+          <p:cNvCxnSpPr>
+            <a:cxnSpLocks/>
+          </p:cNvCxnSpPr>
+          <p:nvPr/>
+        </p:nvCxnSpPr>
+        <p:spPr>
+          <a:xfrm>
+            <a:off x="3230131" y="842654"/>
+            <a:ext cx="723086" cy="0"/>
+          </a:xfrm>
+          <a:prstGeom prst="straightConnector1">
+            <a:avLst/>
+          </a:prstGeom>
+          <a:ln>
+            <a:solidFill>
+              <a:schemeClr val="tx1"/>
+            </a:solidFill>
+            <a:headEnd type="triangle"/>
+            <a:tailEnd type="triangle"/>
+          </a:ln>
+        </p:spPr>
+        <p:style>
+          <a:lnRef idx="1">
+            <a:schemeClr val="accent1"/>
+          </a:lnRef>
+          <a:fillRef idx="0">
+            <a:schemeClr val="accent1"/>
+          </a:fillRef>
+          <a:effectRef idx="0">
+            <a:schemeClr val="accent1"/>
+          </a:effectRef>
+          <a:fontRef idx="minor">
+            <a:schemeClr val="tx1"/>
+          </a:fontRef>
+        </p:style>
+      </p:cxnSp>
+      <p:cxnSp>
+        <p:nvCxnSpPr>
+          <p:cNvPr id="47" name="Straight Arrow Connector 46">
+            <a:extLst>
+              <a:ext uri="{FF2B5EF4-FFF2-40B4-BE49-F238E27FC236}">
+                <a16:creationId xmlns:a16="http://schemas.microsoft.com/office/drawing/2014/main" id="{6ECF2591-6303-4D3A-98F6-ADCF1A0A0484}"/>
+              </a:ext>
+            </a:extLst>
+          </p:cNvPr>
+          <p:cNvCxnSpPr>
+            <a:cxnSpLocks/>
+          </p:cNvCxnSpPr>
+          <p:nvPr/>
+        </p:nvCxnSpPr>
+        <p:spPr>
+          <a:xfrm>
+            <a:off x="3962007" y="842654"/>
+            <a:ext cx="723086" cy="0"/>
+          </a:xfrm>
+          <a:prstGeom prst="straightConnector1">
+            <a:avLst/>
+          </a:prstGeom>
+          <a:ln>
+            <a:solidFill>
+              <a:schemeClr val="tx1"/>
+            </a:solidFill>
+            <a:headEnd type="triangle"/>
+            <a:tailEnd type="triangle"/>
+          </a:ln>
+        </p:spPr>
+        <p:style>
+          <a:lnRef idx="1">
+            <a:schemeClr val="accent1"/>
+          </a:lnRef>
+          <a:fillRef idx="0">
+            <a:schemeClr val="accent1"/>
+          </a:fillRef>
+          <a:effectRef idx="0">
+            <a:schemeClr val="accent1"/>
+          </a:effectRef>
+          <a:fontRef idx="minor">
+            <a:schemeClr val="tx1"/>
+          </a:fontRef>
+        </p:style>
+      </p:cxnSp>
+      <p:cxnSp>
+        <p:nvCxnSpPr>
+          <p:cNvPr id="48" name="Straight Arrow Connector 47">
+            <a:extLst>
+              <a:ext uri="{FF2B5EF4-FFF2-40B4-BE49-F238E27FC236}">
+                <a16:creationId xmlns:a16="http://schemas.microsoft.com/office/drawing/2014/main" id="{9F59297B-19CC-4264-85B4-17D8373D4CCD}"/>
+              </a:ext>
+            </a:extLst>
+          </p:cNvPr>
+          <p:cNvCxnSpPr>
+            <a:cxnSpLocks/>
+          </p:cNvCxnSpPr>
+          <p:nvPr/>
+        </p:nvCxnSpPr>
+        <p:spPr>
+          <a:xfrm>
+            <a:off x="4699737" y="842654"/>
+            <a:ext cx="723086" cy="0"/>
+          </a:xfrm>
+          <a:prstGeom prst="straightConnector1">
+            <a:avLst/>
+          </a:prstGeom>
+          <a:ln>
+            <a:solidFill>
+              <a:schemeClr val="tx1"/>
+            </a:solidFill>
+            <a:headEnd type="triangle"/>
+            <a:tailEnd type="triangle"/>
+          </a:ln>
+        </p:spPr>
+        <p:style>
+          <a:lnRef idx="1">
+            <a:schemeClr val="accent1"/>
+          </a:lnRef>
+          <a:fillRef idx="0">
+            <a:schemeClr val="accent1"/>
+          </a:fillRef>
+          <a:effectRef idx="0">
+            <a:schemeClr val="accent1"/>
+          </a:effectRef>
+          <a:fontRef idx="minor">
+            <a:schemeClr val="tx1"/>
+          </a:fontRef>
+        </p:style>
+      </p:cxnSp>
+      <p:cxnSp>
+        <p:nvCxnSpPr>
+          <p:cNvPr id="49" name="Straight Arrow Connector 48">
+            <a:extLst>
+              <a:ext uri="{FF2B5EF4-FFF2-40B4-BE49-F238E27FC236}">
+                <a16:creationId xmlns:a16="http://schemas.microsoft.com/office/drawing/2014/main" id="{210E18FC-A5A5-48AC-97BE-042ABC87882B}"/>
+              </a:ext>
+            </a:extLst>
+          </p:cNvPr>
+          <p:cNvCxnSpPr>
+            <a:cxnSpLocks/>
+          </p:cNvCxnSpPr>
+          <p:nvPr/>
+        </p:nvCxnSpPr>
+        <p:spPr>
+          <a:xfrm>
+            <a:off x="5456585" y="842654"/>
+            <a:ext cx="723086" cy="0"/>
+          </a:xfrm>
+          <a:prstGeom prst="straightConnector1">
+            <a:avLst/>
+          </a:prstGeom>
+          <a:ln>
+            <a:solidFill>
+              <a:schemeClr val="tx1"/>
+            </a:solidFill>
+            <a:headEnd type="triangle"/>
+            <a:tailEnd type="triangle"/>
+          </a:ln>
+        </p:spPr>
+        <p:style>
+          <a:lnRef idx="1">
+            <a:schemeClr val="accent1"/>
+          </a:lnRef>
+          <a:fillRef idx="0">
+            <a:schemeClr val="accent1"/>
+          </a:fillRef>
+          <a:effectRef idx="0">
+            <a:schemeClr val="accent1"/>
+          </a:effectRef>
+          <a:fontRef idx="minor">
+            <a:schemeClr val="tx1"/>
+          </a:fontRef>
+        </p:style>
+      </p:cxnSp>
+      <p:cxnSp>
+        <p:nvCxnSpPr>
+          <p:cNvPr id="50" name="Straight Arrow Connector 49">
+            <a:extLst>
+              <a:ext uri="{FF2B5EF4-FFF2-40B4-BE49-F238E27FC236}">
+                <a16:creationId xmlns:a16="http://schemas.microsoft.com/office/drawing/2014/main" id="{8EACB604-772A-48AE-92E2-2E7BEEE41A7C}"/>
+              </a:ext>
+            </a:extLst>
+          </p:cNvPr>
+          <p:cNvCxnSpPr>
+            <a:cxnSpLocks/>
+          </p:cNvCxnSpPr>
+          <p:nvPr/>
+        </p:nvCxnSpPr>
+        <p:spPr>
+          <a:xfrm>
+            <a:off x="6195298" y="842654"/>
+            <a:ext cx="723086" cy="0"/>
+          </a:xfrm>
+          <a:prstGeom prst="straightConnector1">
+            <a:avLst/>
+          </a:prstGeom>
+          <a:ln>
+            <a:solidFill>
+              <a:schemeClr val="tx1"/>
+            </a:solidFill>
+            <a:headEnd type="triangle"/>
+            <a:tailEnd type="triangle"/>
+          </a:ln>
+        </p:spPr>
+        <p:style>
+          <a:lnRef idx="1">
+            <a:schemeClr val="accent1"/>
+          </a:lnRef>
+          <a:fillRef idx="0">
+            <a:schemeClr val="accent1"/>
+          </a:fillRef>
+          <a:effectRef idx="0">
+            <a:schemeClr val="accent1"/>
+          </a:effectRef>
+          <a:fontRef idx="minor">
+            <a:schemeClr val="tx1"/>
+          </a:fontRef>
+        </p:style>
+      </p:cxnSp>
+      <p:cxnSp>
+        <p:nvCxnSpPr>
+          <p:cNvPr id="51" name="Straight Arrow Connector 50">
+            <a:extLst>
+              <a:ext uri="{FF2B5EF4-FFF2-40B4-BE49-F238E27FC236}">
+                <a16:creationId xmlns:a16="http://schemas.microsoft.com/office/drawing/2014/main" id="{8DCC1DE0-950D-45C3-9BEC-38AF24C12C1A}"/>
+              </a:ext>
+            </a:extLst>
+          </p:cNvPr>
+          <p:cNvCxnSpPr>
+            <a:cxnSpLocks/>
+          </p:cNvCxnSpPr>
+          <p:nvPr/>
+        </p:nvCxnSpPr>
+        <p:spPr>
+          <a:xfrm>
+            <a:off x="6918384" y="842654"/>
+            <a:ext cx="723086" cy="0"/>
+          </a:xfrm>
+          <a:prstGeom prst="straightConnector1">
+            <a:avLst/>
+          </a:prstGeom>
+          <a:ln>
+            <a:solidFill>
+              <a:schemeClr val="tx1"/>
+            </a:solidFill>
+            <a:headEnd type="triangle"/>
+            <a:tailEnd type="triangle"/>
+          </a:ln>
+        </p:spPr>
+        <p:style>
+          <a:lnRef idx="1">
+            <a:schemeClr val="accent1"/>
+          </a:lnRef>
+          <a:fillRef idx="0">
+            <a:schemeClr val="accent1"/>
+          </a:fillRef>
+          <a:effectRef idx="0">
+            <a:schemeClr val="accent1"/>
+          </a:effectRef>
+          <a:fontRef idx="minor">
+            <a:schemeClr val="tx1"/>
+          </a:fontRef>
+        </p:style>
+      </p:cxnSp>
+      <p:cxnSp>
+        <p:nvCxnSpPr>
+          <p:cNvPr id="52" name="Straight Arrow Connector 51">
+            <a:extLst>
+              <a:ext uri="{FF2B5EF4-FFF2-40B4-BE49-F238E27FC236}">
+                <a16:creationId xmlns:a16="http://schemas.microsoft.com/office/drawing/2014/main" id="{E614183E-6D2B-4DD2-B374-9D59884A395A}"/>
+              </a:ext>
+            </a:extLst>
+          </p:cNvPr>
+          <p:cNvCxnSpPr>
+            <a:cxnSpLocks/>
+          </p:cNvCxnSpPr>
+          <p:nvPr/>
+        </p:nvCxnSpPr>
+        <p:spPr>
+          <a:xfrm>
+            <a:off x="7673312" y="842654"/>
+            <a:ext cx="723086" cy="0"/>
+          </a:xfrm>
+          <a:prstGeom prst="straightConnector1">
+            <a:avLst/>
+          </a:prstGeom>
+          <a:ln>
+            <a:solidFill>
+              <a:schemeClr val="tx1"/>
+            </a:solidFill>
+            <a:headEnd type="triangle"/>
+            <a:tailEnd type="triangle"/>
+          </a:ln>
+        </p:spPr>
+        <p:style>
+          <a:lnRef idx="1">
+            <a:schemeClr val="accent1"/>
+          </a:lnRef>
+          <a:fillRef idx="0">
+            <a:schemeClr val="accent1"/>
+          </a:fillRef>
+          <a:effectRef idx="0">
+            <a:schemeClr val="accent1"/>
+          </a:effectRef>
+          <a:fontRef idx="minor">
+            <a:schemeClr val="tx1"/>
+          </a:fontRef>
+        </p:style>
+      </p:cxnSp>
+      <mc:AlternateContent xmlns:mc="http://schemas.openxmlformats.org/markup-compatibility/2006" xmlns:a14="http://schemas.microsoft.com/office/drawing/2010/main">
+        <mc:Choice Requires="a14">
+          <p:sp>
+            <p:nvSpPr>
+              <p:cNvPr id="53" name="TextBox 52">
+                <a:extLst>
+                  <a:ext uri="{FF2B5EF4-FFF2-40B4-BE49-F238E27FC236}">
+                    <a16:creationId xmlns:a16="http://schemas.microsoft.com/office/drawing/2014/main" id="{35B775CC-3B06-4019-A709-B04F4ABBEC36}"/>
+                  </a:ext>
+                </a:extLst>
+              </p:cNvPr>
+              <p:cNvSpPr txBox="1"/>
+              <p:nvPr/>
+            </p:nvSpPr>
+            <p:spPr>
+              <a:xfrm>
+                <a:off x="916809" y="543454"/>
+                <a:ext cx="886287" cy="307777"/>
+              </a:xfrm>
+              <a:prstGeom prst="rect">
+                <a:avLst/>
+              </a:prstGeom>
+              <a:noFill/>
+            </p:spPr>
+            <p:txBody>
+              <a:bodyPr wrap="square" rtlCol="0">
+                <a:spAutoFit/>
+              </a:bodyPr>
+              <a:lstStyle/>
+              <a:p>
+                <a:pPr/>
+                <a14:m>
+                  <m:oMathPara xmlns:m="http://schemas.openxmlformats.org/officeDocument/2006/math">
+                    <m:oMathParaPr>
+                      <m:jc m:val="centerGroup"/>
+                    </m:oMathParaPr>
+                    <m:oMath xmlns:m="http://schemas.openxmlformats.org/officeDocument/2006/math">
+                      <m:sSub>
+                        <m:sSubPr>
+                          <m:ctrlPr>
+                            <a:rPr lang="en-US" sz="1400" b="0" i="1" smtClean="0">
+                              <a:latin typeface="Cambria Math" panose="02040503050406030204" pitchFamily="18" charset="0"/>
+                            </a:rPr>
+                          </m:ctrlPr>
+                        </m:sSubPr>
+                        <m:e>
+                          <m:r>
+                            <a:rPr lang="en-US" sz="1400" b="0" i="1" smtClean="0">
+                              <a:latin typeface="Cambria Math" panose="02040503050406030204" pitchFamily="18" charset="0"/>
+                            </a:rPr>
+                            <m:t>𝑚</m:t>
+                          </m:r>
+                        </m:e>
+                        <m:sub>
+                          <m:r>
+                            <a:rPr lang="en-US" sz="1400" b="0" i="1" smtClean="0">
+                              <a:latin typeface="Cambria Math" panose="02040503050406030204" pitchFamily="18" charset="0"/>
+                            </a:rPr>
+                            <m:t>𝑎</m:t>
+                          </m:r>
+                        </m:sub>
+                      </m:sSub>
+                      <m:r>
+                        <a:rPr lang="en-US" sz="1400" b="0" i="1" smtClean="0">
+                          <a:latin typeface="Cambria Math" panose="02040503050406030204" pitchFamily="18" charset="0"/>
+                        </a:rPr>
+                        <m:t>=0</m:t>
+                      </m:r>
+                    </m:oMath>
+                  </m:oMathPara>
+                </a14:m>
+                <a:endParaRPr lang="en-US" sz="1400" dirty="0"/>
+              </a:p>
+            </p:txBody>
+          </p:sp>
+        </mc:Choice>
+        <mc:Fallback xmlns="">
+          <p:sp>
+            <p:nvSpPr>
+              <p:cNvPr id="53" name="TextBox 52">
+                <a:extLst>
+                  <a:ext uri="{FF2B5EF4-FFF2-40B4-BE49-F238E27FC236}">
+                    <a16:creationId xmlns:a16="http://schemas.microsoft.com/office/drawing/2014/main" id="{35B775CC-3B06-4019-A709-B04F4ABBEC36}"/>
+                  </a:ext>
+                </a:extLst>
+              </p:cNvPr>
+              <p:cNvSpPr txBox="1">
+                <a:spLocks noRot="1" noChangeAspect="1" noMove="1" noResize="1" noEditPoints="1" noAdjustHandles="1" noChangeArrowheads="1" noChangeShapeType="1" noTextEdit="1"/>
+              </p:cNvSpPr>
+              <p:nvPr/>
+            </p:nvSpPr>
+            <p:spPr>
+              <a:xfrm>
+                <a:off x="916809" y="543454"/>
+                <a:ext cx="886287" cy="307777"/>
+              </a:xfrm>
+              <a:prstGeom prst="rect">
+                <a:avLst/>
+              </a:prstGeom>
+              <a:blipFill>
+                <a:blip r:embed="rId6"/>
+                <a:stretch>
+                  <a:fillRect/>
+                </a:stretch>
+              </a:blipFill>
+            </p:spPr>
+            <p:txBody>
+              <a:bodyPr/>
+              <a:lstStyle/>
+              <a:p>
+                <a:r>
+                  <a:rPr lang="en-US">
+                    <a:noFill/>
+                  </a:rPr>
+                  <a:t> </a:t>
+                </a:r>
+              </a:p>
+            </p:txBody>
+          </p:sp>
+        </mc:Fallback>
+      </mc:AlternateContent>
+      <mc:AlternateContent xmlns:mc="http://schemas.openxmlformats.org/markup-compatibility/2006" xmlns:a14="http://schemas.microsoft.com/office/drawing/2010/main">
+        <mc:Choice Requires="a14">
+          <p:sp>
+            <p:nvSpPr>
+              <p:cNvPr id="54" name="TextBox 53">
+                <a:extLst>
+                  <a:ext uri="{FF2B5EF4-FFF2-40B4-BE49-F238E27FC236}">
+                    <a16:creationId xmlns:a16="http://schemas.microsoft.com/office/drawing/2014/main" id="{A3C519BF-1F1E-4FBA-87B8-E72332E07DB3}"/>
+                  </a:ext>
+                </a:extLst>
+              </p:cNvPr>
+              <p:cNvSpPr txBox="1"/>
+              <p:nvPr/>
+            </p:nvSpPr>
+            <p:spPr>
+              <a:xfrm>
+                <a:off x="1605218" y="538744"/>
+                <a:ext cx="1033754" cy="307777"/>
+              </a:xfrm>
+              <a:prstGeom prst="rect">
+                <a:avLst/>
+              </a:prstGeom>
+              <a:noFill/>
+            </p:spPr>
+            <p:txBody>
+              <a:bodyPr wrap="square" rtlCol="0">
+                <a:spAutoFit/>
+              </a:bodyPr>
+              <a:lstStyle/>
+              <a:p>
+                <a:pPr/>
+                <a14:m>
+                  <m:oMathPara xmlns:m="http://schemas.openxmlformats.org/officeDocument/2006/math">
+                    <m:oMathParaPr>
+                      <m:jc m:val="centerGroup"/>
+                    </m:oMathParaPr>
+                    <m:oMath xmlns:m="http://schemas.openxmlformats.org/officeDocument/2006/math">
+                      <m:sSub>
+                        <m:sSubPr>
+                          <m:ctrlPr>
+                            <a:rPr lang="en-US" sz="1400" b="0" i="1" smtClean="0">
+                              <a:latin typeface="Cambria Math" panose="02040503050406030204" pitchFamily="18" charset="0"/>
+                            </a:rPr>
+                          </m:ctrlPr>
+                        </m:sSubPr>
+                        <m:e>
+                          <m:r>
+                            <a:rPr lang="en-US" sz="1400" b="0" i="1" smtClean="0">
+                              <a:latin typeface="Cambria Math" panose="02040503050406030204" pitchFamily="18" charset="0"/>
+                            </a:rPr>
+                            <m:t>𝑚</m:t>
+                          </m:r>
+                        </m:e>
+                        <m:sub>
+                          <m:r>
+                            <a:rPr lang="en-US" sz="1400" b="0" i="1" smtClean="0">
+                              <a:latin typeface="Cambria Math" panose="02040503050406030204" pitchFamily="18" charset="0"/>
+                            </a:rPr>
+                            <m:t>𝑎</m:t>
+                          </m:r>
+                        </m:sub>
+                      </m:sSub>
+                      <m:r>
+                        <a:rPr lang="en-US" sz="1400" b="0" i="1" smtClean="0">
+                          <a:latin typeface="Cambria Math" panose="02040503050406030204" pitchFamily="18" charset="0"/>
+                        </a:rPr>
+                        <m:t>=0.2</m:t>
+                      </m:r>
+                    </m:oMath>
+                  </m:oMathPara>
+                </a14:m>
+                <a:endParaRPr lang="en-US" sz="1400" dirty="0"/>
+              </a:p>
+            </p:txBody>
+          </p:sp>
+        </mc:Choice>
+        <mc:Fallback xmlns="">
+          <p:sp>
+            <p:nvSpPr>
+              <p:cNvPr id="54" name="TextBox 53">
+                <a:extLst>
+                  <a:ext uri="{FF2B5EF4-FFF2-40B4-BE49-F238E27FC236}">
+                    <a16:creationId xmlns:a16="http://schemas.microsoft.com/office/drawing/2014/main" id="{A3C519BF-1F1E-4FBA-87B8-E72332E07DB3}"/>
+                  </a:ext>
+                </a:extLst>
+              </p:cNvPr>
+              <p:cNvSpPr txBox="1">
+                <a:spLocks noRot="1" noChangeAspect="1" noMove="1" noResize="1" noEditPoints="1" noAdjustHandles="1" noChangeArrowheads="1" noChangeShapeType="1" noTextEdit="1"/>
+              </p:cNvSpPr>
+              <p:nvPr/>
+            </p:nvSpPr>
+            <p:spPr>
+              <a:xfrm>
+                <a:off x="1605218" y="538744"/>
+                <a:ext cx="1033754" cy="307777"/>
+              </a:xfrm>
+              <a:prstGeom prst="rect">
+                <a:avLst/>
+              </a:prstGeom>
+              <a:blipFill>
+                <a:blip r:embed="rId7"/>
+                <a:stretch>
+                  <a:fillRect/>
+                </a:stretch>
+              </a:blipFill>
+            </p:spPr>
+            <p:txBody>
+              <a:bodyPr/>
+              <a:lstStyle/>
+              <a:p>
+                <a:r>
+                  <a:rPr lang="en-US">
+                    <a:noFill/>
+                  </a:rPr>
+                  <a:t> </a:t>
+                </a:r>
+              </a:p>
+            </p:txBody>
+          </p:sp>
+        </mc:Fallback>
+      </mc:AlternateContent>
+      <mc:AlternateContent xmlns:mc="http://schemas.openxmlformats.org/markup-compatibility/2006" xmlns:a14="http://schemas.microsoft.com/office/drawing/2010/main">
+        <mc:Choice Requires="a14">
+          <p:sp>
+            <p:nvSpPr>
+              <p:cNvPr id="55" name="TextBox 54">
+                <a:extLst>
+                  <a:ext uri="{FF2B5EF4-FFF2-40B4-BE49-F238E27FC236}">
+                    <a16:creationId xmlns:a16="http://schemas.microsoft.com/office/drawing/2014/main" id="{93993938-694E-48E5-ACE3-E79BBA6F573A}"/>
+                  </a:ext>
+                </a:extLst>
+              </p:cNvPr>
+              <p:cNvSpPr txBox="1"/>
+              <p:nvPr/>
+            </p:nvSpPr>
+            <p:spPr>
+              <a:xfrm>
+                <a:off x="2351559" y="543747"/>
+                <a:ext cx="1033754" cy="307777"/>
+              </a:xfrm>
+              <a:prstGeom prst="rect">
+                <a:avLst/>
+              </a:prstGeom>
+              <a:noFill/>
+            </p:spPr>
+            <p:txBody>
+              <a:bodyPr wrap="square" rtlCol="0">
+                <a:spAutoFit/>
+              </a:bodyPr>
+              <a:lstStyle/>
+              <a:p>
+                <a:pPr/>
+                <a14:m>
+                  <m:oMathPara xmlns:m="http://schemas.openxmlformats.org/officeDocument/2006/math">
+                    <m:oMathParaPr>
+                      <m:jc m:val="centerGroup"/>
+                    </m:oMathParaPr>
+                    <m:oMath xmlns:m="http://schemas.openxmlformats.org/officeDocument/2006/math">
+                      <m:sSub>
+                        <m:sSubPr>
+                          <m:ctrlPr>
+                            <a:rPr lang="en-US" sz="1400" b="0" i="1" smtClean="0">
+                              <a:latin typeface="Cambria Math" panose="02040503050406030204" pitchFamily="18" charset="0"/>
+                            </a:rPr>
+                          </m:ctrlPr>
+                        </m:sSubPr>
+                        <m:e>
+                          <m:r>
+                            <a:rPr lang="en-US" sz="1400" b="0" i="1" smtClean="0">
+                              <a:latin typeface="Cambria Math" panose="02040503050406030204" pitchFamily="18" charset="0"/>
+                            </a:rPr>
+                            <m:t>𝑚</m:t>
+                          </m:r>
+                        </m:e>
+                        <m:sub>
+                          <m:r>
+                            <a:rPr lang="en-US" sz="1400" b="0" i="1" smtClean="0">
+                              <a:latin typeface="Cambria Math" panose="02040503050406030204" pitchFamily="18" charset="0"/>
+                            </a:rPr>
+                            <m:t>𝑎</m:t>
+                          </m:r>
+                        </m:sub>
+                      </m:sSub>
+                      <m:r>
+                        <a:rPr lang="en-US" sz="1400" b="0" i="1" smtClean="0">
+                          <a:latin typeface="Cambria Math" panose="02040503050406030204" pitchFamily="18" charset="0"/>
+                        </a:rPr>
+                        <m:t>=0.3</m:t>
+                      </m:r>
+                    </m:oMath>
+                  </m:oMathPara>
+                </a14:m>
+                <a:endParaRPr lang="en-US" sz="1400" dirty="0"/>
+              </a:p>
+            </p:txBody>
+          </p:sp>
+        </mc:Choice>
+        <mc:Fallback xmlns="">
+          <p:sp>
+            <p:nvSpPr>
+              <p:cNvPr id="55" name="TextBox 54">
+                <a:extLst>
+                  <a:ext uri="{FF2B5EF4-FFF2-40B4-BE49-F238E27FC236}">
+                    <a16:creationId xmlns:a16="http://schemas.microsoft.com/office/drawing/2014/main" id="{93993938-694E-48E5-ACE3-E79BBA6F573A}"/>
+                  </a:ext>
+                </a:extLst>
+              </p:cNvPr>
+              <p:cNvSpPr txBox="1">
+                <a:spLocks noRot="1" noChangeAspect="1" noMove="1" noResize="1" noEditPoints="1" noAdjustHandles="1" noChangeArrowheads="1" noChangeShapeType="1" noTextEdit="1"/>
+              </p:cNvSpPr>
+              <p:nvPr/>
+            </p:nvSpPr>
+            <p:spPr>
+              <a:xfrm>
+                <a:off x="2351559" y="543747"/>
+                <a:ext cx="1033754" cy="307777"/>
+              </a:xfrm>
+              <a:prstGeom prst="rect">
+                <a:avLst/>
+              </a:prstGeom>
+              <a:blipFill>
+                <a:blip r:embed="rId8"/>
+                <a:stretch>
+                  <a:fillRect/>
+                </a:stretch>
+              </a:blipFill>
+            </p:spPr>
+            <p:txBody>
+              <a:bodyPr/>
+              <a:lstStyle/>
+              <a:p>
+                <a:r>
+                  <a:rPr lang="en-US">
+                    <a:noFill/>
+                  </a:rPr>
+                  <a:t> </a:t>
+                </a:r>
+              </a:p>
+            </p:txBody>
+          </p:sp>
+        </mc:Fallback>
+      </mc:AlternateContent>
+      <mc:AlternateContent xmlns:mc="http://schemas.openxmlformats.org/markup-compatibility/2006" xmlns:a14="http://schemas.microsoft.com/office/drawing/2010/main">
+        <mc:Choice Requires="a14">
+          <p:sp>
+            <p:nvSpPr>
+              <p:cNvPr id="56" name="TextBox 55">
+                <a:extLst>
+                  <a:ext uri="{FF2B5EF4-FFF2-40B4-BE49-F238E27FC236}">
+                    <a16:creationId xmlns:a16="http://schemas.microsoft.com/office/drawing/2014/main" id="{13A6929C-9653-44D0-897E-E7B869EF2428}"/>
+                  </a:ext>
+                </a:extLst>
+              </p:cNvPr>
+              <p:cNvSpPr txBox="1"/>
+              <p:nvPr/>
+            </p:nvSpPr>
+            <p:spPr>
+              <a:xfrm>
+                <a:off x="3088309" y="535046"/>
+                <a:ext cx="1033754" cy="307777"/>
+              </a:xfrm>
+              <a:prstGeom prst="rect">
+                <a:avLst/>
+              </a:prstGeom>
+              <a:noFill/>
+            </p:spPr>
+            <p:txBody>
+              <a:bodyPr wrap="square" rtlCol="0">
+                <a:spAutoFit/>
+              </a:bodyPr>
+              <a:lstStyle/>
+              <a:p>
+                <a:pPr/>
+                <a14:m>
+                  <m:oMathPara xmlns:m="http://schemas.openxmlformats.org/officeDocument/2006/math">
+                    <m:oMathParaPr>
+                      <m:jc m:val="centerGroup"/>
+                    </m:oMathParaPr>
+                    <m:oMath xmlns:m="http://schemas.openxmlformats.org/officeDocument/2006/math">
+                      <m:sSub>
+                        <m:sSubPr>
+                          <m:ctrlPr>
+                            <a:rPr lang="en-US" sz="1400" b="0" i="1" smtClean="0">
+                              <a:latin typeface="Cambria Math" panose="02040503050406030204" pitchFamily="18" charset="0"/>
+                            </a:rPr>
+                          </m:ctrlPr>
+                        </m:sSubPr>
+                        <m:e>
+                          <m:r>
+                            <a:rPr lang="en-US" sz="1400" b="0" i="1" smtClean="0">
+                              <a:latin typeface="Cambria Math" panose="02040503050406030204" pitchFamily="18" charset="0"/>
+                            </a:rPr>
+                            <m:t>𝑚</m:t>
+                          </m:r>
+                        </m:e>
+                        <m:sub>
+                          <m:r>
+                            <a:rPr lang="en-US" sz="1400" b="0" i="1" smtClean="0">
+                              <a:latin typeface="Cambria Math" panose="02040503050406030204" pitchFamily="18" charset="0"/>
+                            </a:rPr>
+                            <m:t>𝑎</m:t>
+                          </m:r>
+                        </m:sub>
+                      </m:sSub>
+                      <m:r>
+                        <a:rPr lang="en-US" sz="1400" b="0" i="1" smtClean="0">
+                          <a:latin typeface="Cambria Math" panose="02040503050406030204" pitchFamily="18" charset="0"/>
+                        </a:rPr>
+                        <m:t>=0.4</m:t>
+                      </m:r>
+                    </m:oMath>
+                  </m:oMathPara>
+                </a14:m>
+                <a:endParaRPr lang="en-US" sz="1400" dirty="0"/>
+              </a:p>
+            </p:txBody>
+          </p:sp>
+        </mc:Choice>
+        <mc:Fallback xmlns="">
+          <p:sp>
+            <p:nvSpPr>
+              <p:cNvPr id="56" name="TextBox 55">
+                <a:extLst>
+                  <a:ext uri="{FF2B5EF4-FFF2-40B4-BE49-F238E27FC236}">
+                    <a16:creationId xmlns:a16="http://schemas.microsoft.com/office/drawing/2014/main" id="{13A6929C-9653-44D0-897E-E7B869EF2428}"/>
+                  </a:ext>
+                </a:extLst>
+              </p:cNvPr>
+              <p:cNvSpPr txBox="1">
+                <a:spLocks noRot="1" noChangeAspect="1" noMove="1" noResize="1" noEditPoints="1" noAdjustHandles="1" noChangeArrowheads="1" noChangeShapeType="1" noTextEdit="1"/>
+              </p:cNvSpPr>
+              <p:nvPr/>
+            </p:nvSpPr>
+            <p:spPr>
+              <a:xfrm>
+                <a:off x="3088309" y="535046"/>
+                <a:ext cx="1033754" cy="307777"/>
+              </a:xfrm>
+              <a:prstGeom prst="rect">
+                <a:avLst/>
+              </a:prstGeom>
+              <a:blipFill>
+                <a:blip r:embed="rId9"/>
+                <a:stretch>
+                  <a:fillRect/>
+                </a:stretch>
+              </a:blipFill>
+            </p:spPr>
+            <p:txBody>
+              <a:bodyPr/>
+              <a:lstStyle/>
+              <a:p>
+                <a:r>
+                  <a:rPr lang="en-US">
+                    <a:noFill/>
+                  </a:rPr>
+                  <a:t> </a:t>
+                </a:r>
+              </a:p>
+            </p:txBody>
+          </p:sp>
+        </mc:Fallback>
+      </mc:AlternateContent>
+      <mc:AlternateContent xmlns:mc="http://schemas.openxmlformats.org/markup-compatibility/2006" xmlns:a14="http://schemas.microsoft.com/office/drawing/2010/main">
+        <mc:Choice Requires="a14">
+          <p:sp>
+            <p:nvSpPr>
+              <p:cNvPr id="57" name="TextBox 56">
+                <a:extLst>
+                  <a:ext uri="{FF2B5EF4-FFF2-40B4-BE49-F238E27FC236}">
+                    <a16:creationId xmlns:a16="http://schemas.microsoft.com/office/drawing/2014/main" id="{F7822F53-BE15-437B-9A1E-970ED6420DC4}"/>
+                  </a:ext>
+                </a:extLst>
+              </p:cNvPr>
+              <p:cNvSpPr txBox="1"/>
+              <p:nvPr/>
+            </p:nvSpPr>
+            <p:spPr>
+              <a:xfrm>
+                <a:off x="3823911" y="535338"/>
+                <a:ext cx="1033754" cy="307777"/>
+              </a:xfrm>
+              <a:prstGeom prst="rect">
+                <a:avLst/>
+              </a:prstGeom>
+              <a:noFill/>
+            </p:spPr>
+            <p:txBody>
+              <a:bodyPr wrap="square" rtlCol="0">
+                <a:spAutoFit/>
+              </a:bodyPr>
+              <a:lstStyle/>
+              <a:p>
+                <a:pPr/>
+                <a14:m>
+                  <m:oMathPara xmlns:m="http://schemas.openxmlformats.org/officeDocument/2006/math">
+                    <m:oMathParaPr>
+                      <m:jc m:val="centerGroup"/>
+                    </m:oMathParaPr>
+                    <m:oMath xmlns:m="http://schemas.openxmlformats.org/officeDocument/2006/math">
+                      <m:sSub>
+                        <m:sSubPr>
+                          <m:ctrlPr>
+                            <a:rPr lang="en-US" sz="1400" b="0" i="1" smtClean="0">
+                              <a:latin typeface="Cambria Math" panose="02040503050406030204" pitchFamily="18" charset="0"/>
+                            </a:rPr>
+                          </m:ctrlPr>
+                        </m:sSubPr>
+                        <m:e>
+                          <m:r>
+                            <a:rPr lang="en-US" sz="1400" b="0" i="1" smtClean="0">
+                              <a:latin typeface="Cambria Math" panose="02040503050406030204" pitchFamily="18" charset="0"/>
+                            </a:rPr>
+                            <m:t>𝑚</m:t>
+                          </m:r>
+                        </m:e>
+                        <m:sub>
+                          <m:r>
+                            <a:rPr lang="en-US" sz="1400" b="0" i="1" smtClean="0">
+                              <a:latin typeface="Cambria Math" panose="02040503050406030204" pitchFamily="18" charset="0"/>
+                            </a:rPr>
+                            <m:t>𝑎</m:t>
+                          </m:r>
+                        </m:sub>
+                      </m:sSub>
+                      <m:r>
+                        <a:rPr lang="en-US" sz="1400" b="0" i="1" smtClean="0">
+                          <a:latin typeface="Cambria Math" panose="02040503050406030204" pitchFamily="18" charset="0"/>
+                        </a:rPr>
+                        <m:t>=0.5</m:t>
+                      </m:r>
+                    </m:oMath>
+                  </m:oMathPara>
+                </a14:m>
+                <a:endParaRPr lang="en-US" sz="1400" dirty="0"/>
+              </a:p>
+            </p:txBody>
+          </p:sp>
+        </mc:Choice>
+        <mc:Fallback xmlns="">
+          <p:sp>
+            <p:nvSpPr>
+              <p:cNvPr id="57" name="TextBox 56">
+                <a:extLst>
+                  <a:ext uri="{FF2B5EF4-FFF2-40B4-BE49-F238E27FC236}">
+                    <a16:creationId xmlns:a16="http://schemas.microsoft.com/office/drawing/2014/main" id="{F7822F53-BE15-437B-9A1E-970ED6420DC4}"/>
+                  </a:ext>
+                </a:extLst>
+              </p:cNvPr>
+              <p:cNvSpPr txBox="1">
+                <a:spLocks noRot="1" noChangeAspect="1" noMove="1" noResize="1" noEditPoints="1" noAdjustHandles="1" noChangeArrowheads="1" noChangeShapeType="1" noTextEdit="1"/>
+              </p:cNvSpPr>
+              <p:nvPr/>
+            </p:nvSpPr>
+            <p:spPr>
+              <a:xfrm>
+                <a:off x="3823911" y="535338"/>
+                <a:ext cx="1033754" cy="307777"/>
+              </a:xfrm>
+              <a:prstGeom prst="rect">
+                <a:avLst/>
+              </a:prstGeom>
+              <a:blipFill>
+                <a:blip r:embed="rId10"/>
+                <a:stretch>
+                  <a:fillRect/>
+                </a:stretch>
+              </a:blipFill>
+            </p:spPr>
+            <p:txBody>
+              <a:bodyPr/>
+              <a:lstStyle/>
+              <a:p>
+                <a:r>
+                  <a:rPr lang="en-US">
+                    <a:noFill/>
+                  </a:rPr>
+                  <a:t> </a:t>
+                </a:r>
+              </a:p>
+            </p:txBody>
+          </p:sp>
+        </mc:Fallback>
+      </mc:AlternateContent>
+      <mc:AlternateContent xmlns:mc="http://schemas.openxmlformats.org/markup-compatibility/2006" xmlns:a14="http://schemas.microsoft.com/office/drawing/2010/main">
+        <mc:Choice Requires="a14">
+          <p:sp>
+            <p:nvSpPr>
+              <p:cNvPr id="58" name="TextBox 57">
+                <a:extLst>
+                  <a:ext uri="{FF2B5EF4-FFF2-40B4-BE49-F238E27FC236}">
+                    <a16:creationId xmlns:a16="http://schemas.microsoft.com/office/drawing/2014/main" id="{2EB10FE0-5F61-4421-B161-46EB1D1AC08C}"/>
+                  </a:ext>
+                </a:extLst>
+              </p:cNvPr>
+              <p:cNvSpPr txBox="1"/>
+              <p:nvPr/>
+            </p:nvSpPr>
+            <p:spPr>
+              <a:xfrm>
+                <a:off x="4561793" y="534672"/>
+                <a:ext cx="1033754" cy="307777"/>
+              </a:xfrm>
+              <a:prstGeom prst="rect">
+                <a:avLst/>
+              </a:prstGeom>
+              <a:noFill/>
+            </p:spPr>
+            <p:txBody>
+              <a:bodyPr wrap="square" rtlCol="0">
+                <a:spAutoFit/>
+              </a:bodyPr>
+              <a:lstStyle/>
+              <a:p>
+                <a:pPr/>
+                <a14:m>
+                  <m:oMathPara xmlns:m="http://schemas.openxmlformats.org/officeDocument/2006/math">
+                    <m:oMathParaPr>
+                      <m:jc m:val="centerGroup"/>
+                    </m:oMathParaPr>
+                    <m:oMath xmlns:m="http://schemas.openxmlformats.org/officeDocument/2006/math">
+                      <m:sSub>
+                        <m:sSubPr>
+                          <m:ctrlPr>
+                            <a:rPr lang="en-US" sz="1400" b="0" i="1" smtClean="0">
+                              <a:latin typeface="Cambria Math" panose="02040503050406030204" pitchFamily="18" charset="0"/>
+                            </a:rPr>
+                          </m:ctrlPr>
+                        </m:sSubPr>
+                        <m:e>
+                          <m:r>
+                            <a:rPr lang="en-US" sz="1400" b="0" i="1" smtClean="0">
+                              <a:latin typeface="Cambria Math" panose="02040503050406030204" pitchFamily="18" charset="0"/>
+                            </a:rPr>
+                            <m:t>𝑚</m:t>
+                          </m:r>
+                        </m:e>
+                        <m:sub>
+                          <m:r>
+                            <a:rPr lang="en-US" sz="1400" b="0" i="1" smtClean="0">
+                              <a:latin typeface="Cambria Math" panose="02040503050406030204" pitchFamily="18" charset="0"/>
+                            </a:rPr>
+                            <m:t>𝑎</m:t>
+                          </m:r>
+                        </m:sub>
+                      </m:sSub>
+                      <m:r>
+                        <a:rPr lang="en-US" sz="1400" b="0" i="1" smtClean="0">
+                          <a:latin typeface="Cambria Math" panose="02040503050406030204" pitchFamily="18" charset="0"/>
+                        </a:rPr>
+                        <m:t>=0.6</m:t>
+                      </m:r>
+                    </m:oMath>
+                  </m:oMathPara>
+                </a14:m>
+                <a:endParaRPr lang="en-US" sz="1400" dirty="0"/>
+              </a:p>
+            </p:txBody>
+          </p:sp>
+        </mc:Choice>
+        <mc:Fallback xmlns="">
+          <p:sp>
+            <p:nvSpPr>
+              <p:cNvPr id="58" name="TextBox 57">
+                <a:extLst>
+                  <a:ext uri="{FF2B5EF4-FFF2-40B4-BE49-F238E27FC236}">
+                    <a16:creationId xmlns:a16="http://schemas.microsoft.com/office/drawing/2014/main" id="{2EB10FE0-5F61-4421-B161-46EB1D1AC08C}"/>
+                  </a:ext>
+                </a:extLst>
+              </p:cNvPr>
+              <p:cNvSpPr txBox="1">
+                <a:spLocks noRot="1" noChangeAspect="1" noMove="1" noResize="1" noEditPoints="1" noAdjustHandles="1" noChangeArrowheads="1" noChangeShapeType="1" noTextEdit="1"/>
+              </p:cNvSpPr>
+              <p:nvPr/>
+            </p:nvSpPr>
+            <p:spPr>
+              <a:xfrm>
+                <a:off x="4561793" y="534672"/>
+                <a:ext cx="1033754" cy="307777"/>
+              </a:xfrm>
+              <a:prstGeom prst="rect">
+                <a:avLst/>
+              </a:prstGeom>
+              <a:blipFill>
+                <a:blip r:embed="rId11"/>
+                <a:stretch>
+                  <a:fillRect/>
+                </a:stretch>
+              </a:blipFill>
+            </p:spPr>
+            <p:txBody>
+              <a:bodyPr/>
+              <a:lstStyle/>
+              <a:p>
+                <a:r>
+                  <a:rPr lang="en-US">
+                    <a:noFill/>
+                  </a:rPr>
+                  <a:t> </a:t>
+                </a:r>
+              </a:p>
+            </p:txBody>
+          </p:sp>
+        </mc:Fallback>
+      </mc:AlternateContent>
+      <mc:AlternateContent xmlns:mc="http://schemas.openxmlformats.org/markup-compatibility/2006" xmlns:a14="http://schemas.microsoft.com/office/drawing/2010/main">
+        <mc:Choice Requires="a14">
+          <p:sp>
+            <p:nvSpPr>
+              <p:cNvPr id="59" name="TextBox 58">
+                <a:extLst>
+                  <a:ext uri="{FF2B5EF4-FFF2-40B4-BE49-F238E27FC236}">
+                    <a16:creationId xmlns:a16="http://schemas.microsoft.com/office/drawing/2014/main" id="{414D36B8-07C2-4888-B88E-D3B6EAE4041A}"/>
+                  </a:ext>
+                </a:extLst>
+              </p:cNvPr>
+              <p:cNvSpPr txBox="1"/>
+              <p:nvPr/>
+            </p:nvSpPr>
+            <p:spPr>
+              <a:xfrm>
+                <a:off x="5308895" y="534774"/>
+                <a:ext cx="1033754" cy="307777"/>
+              </a:xfrm>
+              <a:prstGeom prst="rect">
+                <a:avLst/>
+              </a:prstGeom>
+              <a:noFill/>
+            </p:spPr>
+            <p:txBody>
+              <a:bodyPr wrap="square" rtlCol="0">
+                <a:spAutoFit/>
+              </a:bodyPr>
+              <a:lstStyle/>
+              <a:p>
+                <a:pPr/>
+                <a14:m>
+                  <m:oMathPara xmlns:m="http://schemas.openxmlformats.org/officeDocument/2006/math">
+                    <m:oMathParaPr>
+                      <m:jc m:val="centerGroup"/>
+                    </m:oMathParaPr>
+                    <m:oMath xmlns:m="http://schemas.openxmlformats.org/officeDocument/2006/math">
+                      <m:sSub>
+                        <m:sSubPr>
+                          <m:ctrlPr>
+                            <a:rPr lang="en-US" sz="1400" b="0" i="1" smtClean="0">
+                              <a:latin typeface="Cambria Math" panose="02040503050406030204" pitchFamily="18" charset="0"/>
+                            </a:rPr>
+                          </m:ctrlPr>
+                        </m:sSubPr>
+                        <m:e>
+                          <m:r>
+                            <a:rPr lang="en-US" sz="1400" b="0" i="1" smtClean="0">
+                              <a:latin typeface="Cambria Math" panose="02040503050406030204" pitchFamily="18" charset="0"/>
+                            </a:rPr>
+                            <m:t>𝑚</m:t>
+                          </m:r>
+                        </m:e>
+                        <m:sub>
+                          <m:r>
+                            <a:rPr lang="en-US" sz="1400" b="0" i="1" smtClean="0">
+                              <a:latin typeface="Cambria Math" panose="02040503050406030204" pitchFamily="18" charset="0"/>
+                            </a:rPr>
+                            <m:t>𝑎</m:t>
+                          </m:r>
+                        </m:sub>
+                      </m:sSub>
+                      <m:r>
+                        <a:rPr lang="en-US" sz="1400" b="0" i="1" smtClean="0">
+                          <a:latin typeface="Cambria Math" panose="02040503050406030204" pitchFamily="18" charset="0"/>
+                        </a:rPr>
+                        <m:t>=0.7</m:t>
+                      </m:r>
+                    </m:oMath>
+                  </m:oMathPara>
+                </a14:m>
+                <a:endParaRPr lang="en-US" sz="1400" dirty="0"/>
+              </a:p>
+            </p:txBody>
+          </p:sp>
+        </mc:Choice>
+        <mc:Fallback xmlns="">
+          <p:sp>
+            <p:nvSpPr>
+              <p:cNvPr id="59" name="TextBox 58">
+                <a:extLst>
+                  <a:ext uri="{FF2B5EF4-FFF2-40B4-BE49-F238E27FC236}">
+                    <a16:creationId xmlns:a16="http://schemas.microsoft.com/office/drawing/2014/main" id="{414D36B8-07C2-4888-B88E-D3B6EAE4041A}"/>
+                  </a:ext>
+                </a:extLst>
+              </p:cNvPr>
+              <p:cNvSpPr txBox="1">
+                <a:spLocks noRot="1" noChangeAspect="1" noMove="1" noResize="1" noEditPoints="1" noAdjustHandles="1" noChangeArrowheads="1" noChangeShapeType="1" noTextEdit="1"/>
+              </p:cNvSpPr>
+              <p:nvPr/>
+            </p:nvSpPr>
+            <p:spPr>
+              <a:xfrm>
+                <a:off x="5308895" y="534774"/>
+                <a:ext cx="1033754" cy="307777"/>
+              </a:xfrm>
+              <a:prstGeom prst="rect">
+                <a:avLst/>
+              </a:prstGeom>
+              <a:blipFill>
+                <a:blip r:embed="rId12"/>
+                <a:stretch>
+                  <a:fillRect/>
+                </a:stretch>
+              </a:blipFill>
+            </p:spPr>
+            <p:txBody>
+              <a:bodyPr/>
+              <a:lstStyle/>
+              <a:p>
+                <a:r>
+                  <a:rPr lang="en-US">
+                    <a:noFill/>
+                  </a:rPr>
+                  <a:t> </a:t>
+                </a:r>
+              </a:p>
+            </p:txBody>
+          </p:sp>
+        </mc:Fallback>
+      </mc:AlternateContent>
+      <mc:AlternateContent xmlns:mc="http://schemas.openxmlformats.org/markup-compatibility/2006" xmlns:a14="http://schemas.microsoft.com/office/drawing/2010/main">
+        <mc:Choice Requires="a14">
+          <p:sp>
+            <p:nvSpPr>
+              <p:cNvPr id="60" name="TextBox 59">
+                <a:extLst>
+                  <a:ext uri="{FF2B5EF4-FFF2-40B4-BE49-F238E27FC236}">
+                    <a16:creationId xmlns:a16="http://schemas.microsoft.com/office/drawing/2014/main" id="{907C7332-425D-4C55-A153-38E2F6CA1FBA}"/>
+                  </a:ext>
+                </a:extLst>
+              </p:cNvPr>
+              <p:cNvSpPr txBox="1"/>
+              <p:nvPr/>
+            </p:nvSpPr>
+            <p:spPr>
+              <a:xfrm>
+                <a:off x="6037899" y="536055"/>
+                <a:ext cx="1033754" cy="307777"/>
+              </a:xfrm>
+              <a:prstGeom prst="rect">
+                <a:avLst/>
+              </a:prstGeom>
+              <a:noFill/>
+            </p:spPr>
+            <p:txBody>
+              <a:bodyPr wrap="square" rtlCol="0">
+                <a:spAutoFit/>
+              </a:bodyPr>
+              <a:lstStyle/>
+              <a:p>
+                <a:pPr/>
+                <a14:m>
+                  <m:oMathPara xmlns:m="http://schemas.openxmlformats.org/officeDocument/2006/math">
+                    <m:oMathParaPr>
+                      <m:jc m:val="centerGroup"/>
+                    </m:oMathParaPr>
+                    <m:oMath xmlns:m="http://schemas.openxmlformats.org/officeDocument/2006/math">
+                      <m:sSub>
+                        <m:sSubPr>
+                          <m:ctrlPr>
+                            <a:rPr lang="en-US" sz="1400" b="0" i="1" smtClean="0">
+                              <a:latin typeface="Cambria Math" panose="02040503050406030204" pitchFamily="18" charset="0"/>
+                            </a:rPr>
+                          </m:ctrlPr>
+                        </m:sSubPr>
+                        <m:e>
+                          <m:r>
+                            <a:rPr lang="en-US" sz="1400" b="0" i="1" smtClean="0">
+                              <a:latin typeface="Cambria Math" panose="02040503050406030204" pitchFamily="18" charset="0"/>
+                            </a:rPr>
+                            <m:t>𝑚</m:t>
+                          </m:r>
+                        </m:e>
+                        <m:sub>
+                          <m:r>
+                            <a:rPr lang="en-US" sz="1400" b="0" i="1" smtClean="0">
+                              <a:latin typeface="Cambria Math" panose="02040503050406030204" pitchFamily="18" charset="0"/>
+                            </a:rPr>
+                            <m:t>𝑎</m:t>
+                          </m:r>
+                        </m:sub>
+                      </m:sSub>
+                      <m:r>
+                        <a:rPr lang="en-US" sz="1400" b="0" i="1" smtClean="0">
+                          <a:latin typeface="Cambria Math" panose="02040503050406030204" pitchFamily="18" charset="0"/>
+                        </a:rPr>
+                        <m:t>=0.8</m:t>
+                      </m:r>
+                    </m:oMath>
+                  </m:oMathPara>
+                </a14:m>
+                <a:endParaRPr lang="en-US" sz="1400" dirty="0"/>
+              </a:p>
+            </p:txBody>
+          </p:sp>
+        </mc:Choice>
+        <mc:Fallback xmlns="">
+          <p:sp>
+            <p:nvSpPr>
+              <p:cNvPr id="60" name="TextBox 59">
+                <a:extLst>
+                  <a:ext uri="{FF2B5EF4-FFF2-40B4-BE49-F238E27FC236}">
+                    <a16:creationId xmlns:a16="http://schemas.microsoft.com/office/drawing/2014/main" id="{907C7332-425D-4C55-A153-38E2F6CA1FBA}"/>
+                  </a:ext>
+                </a:extLst>
+              </p:cNvPr>
+              <p:cNvSpPr txBox="1">
+                <a:spLocks noRot="1" noChangeAspect="1" noMove="1" noResize="1" noEditPoints="1" noAdjustHandles="1" noChangeArrowheads="1" noChangeShapeType="1" noTextEdit="1"/>
+              </p:cNvSpPr>
+              <p:nvPr/>
+            </p:nvSpPr>
+            <p:spPr>
+              <a:xfrm>
+                <a:off x="6037899" y="536055"/>
+                <a:ext cx="1033754" cy="307777"/>
+              </a:xfrm>
+              <a:prstGeom prst="rect">
+                <a:avLst/>
+              </a:prstGeom>
+              <a:blipFill>
+                <a:blip r:embed="rId13"/>
+                <a:stretch>
+                  <a:fillRect/>
+                </a:stretch>
+              </a:blipFill>
+            </p:spPr>
+            <p:txBody>
+              <a:bodyPr/>
+              <a:lstStyle/>
+              <a:p>
+                <a:r>
+                  <a:rPr lang="en-US">
+                    <a:noFill/>
+                  </a:rPr>
+                  <a:t> </a:t>
+                </a:r>
+              </a:p>
+            </p:txBody>
+          </p:sp>
+        </mc:Fallback>
+      </mc:AlternateContent>
+      <mc:AlternateContent xmlns:mc="http://schemas.openxmlformats.org/markup-compatibility/2006" xmlns:a14="http://schemas.microsoft.com/office/drawing/2010/main">
+        <mc:Choice Requires="a14">
+          <p:sp>
+            <p:nvSpPr>
+              <p:cNvPr id="61" name="TextBox 60">
+                <a:extLst>
+                  <a:ext uri="{FF2B5EF4-FFF2-40B4-BE49-F238E27FC236}">
+                    <a16:creationId xmlns:a16="http://schemas.microsoft.com/office/drawing/2014/main" id="{0B962D1D-5471-44BA-BF28-2017D2D2EE1A}"/>
+                  </a:ext>
+                </a:extLst>
+              </p:cNvPr>
+              <p:cNvSpPr txBox="1"/>
+              <p:nvPr/>
+            </p:nvSpPr>
+            <p:spPr>
+              <a:xfrm>
+                <a:off x="6784106" y="527717"/>
+                <a:ext cx="1033754" cy="307777"/>
+              </a:xfrm>
+              <a:prstGeom prst="rect">
+                <a:avLst/>
+              </a:prstGeom>
+              <a:noFill/>
+            </p:spPr>
+            <p:txBody>
+              <a:bodyPr wrap="square" rtlCol="0">
+                <a:spAutoFit/>
+              </a:bodyPr>
+              <a:lstStyle/>
+              <a:p>
+                <a:pPr/>
+                <a14:m>
+                  <m:oMathPara xmlns:m="http://schemas.openxmlformats.org/officeDocument/2006/math">
+                    <m:oMathParaPr>
+                      <m:jc m:val="centerGroup"/>
+                    </m:oMathParaPr>
+                    <m:oMath xmlns:m="http://schemas.openxmlformats.org/officeDocument/2006/math">
+                      <m:sSub>
+                        <m:sSubPr>
+                          <m:ctrlPr>
+                            <a:rPr lang="en-US" sz="1400" b="0" i="1" smtClean="0">
+                              <a:latin typeface="Cambria Math" panose="02040503050406030204" pitchFamily="18" charset="0"/>
+                            </a:rPr>
+                          </m:ctrlPr>
+                        </m:sSubPr>
+                        <m:e>
+                          <m:r>
+                            <a:rPr lang="en-US" sz="1400" b="0" i="1" smtClean="0">
+                              <a:latin typeface="Cambria Math" panose="02040503050406030204" pitchFamily="18" charset="0"/>
+                            </a:rPr>
+                            <m:t>𝑚</m:t>
+                          </m:r>
+                        </m:e>
+                        <m:sub>
+                          <m:r>
+                            <a:rPr lang="en-US" sz="1400" b="0" i="1" smtClean="0">
+                              <a:latin typeface="Cambria Math" panose="02040503050406030204" pitchFamily="18" charset="0"/>
+                            </a:rPr>
+                            <m:t>𝑎</m:t>
+                          </m:r>
+                        </m:sub>
+                      </m:sSub>
+                      <m:r>
+                        <a:rPr lang="en-US" sz="1400" b="0" i="1" smtClean="0">
+                          <a:latin typeface="Cambria Math" panose="02040503050406030204" pitchFamily="18" charset="0"/>
+                        </a:rPr>
+                        <m:t>=0.9</m:t>
+                      </m:r>
+                    </m:oMath>
+                  </m:oMathPara>
+                </a14:m>
+                <a:endParaRPr lang="en-US" sz="1400" dirty="0"/>
+              </a:p>
+            </p:txBody>
+          </p:sp>
+        </mc:Choice>
+        <mc:Fallback xmlns="">
+          <p:sp>
+            <p:nvSpPr>
+              <p:cNvPr id="61" name="TextBox 60">
+                <a:extLst>
+                  <a:ext uri="{FF2B5EF4-FFF2-40B4-BE49-F238E27FC236}">
+                    <a16:creationId xmlns:a16="http://schemas.microsoft.com/office/drawing/2014/main" id="{0B962D1D-5471-44BA-BF28-2017D2D2EE1A}"/>
+                  </a:ext>
+                </a:extLst>
+              </p:cNvPr>
+              <p:cNvSpPr txBox="1">
+                <a:spLocks noRot="1" noChangeAspect="1" noMove="1" noResize="1" noEditPoints="1" noAdjustHandles="1" noChangeArrowheads="1" noChangeShapeType="1" noTextEdit="1"/>
+              </p:cNvSpPr>
+              <p:nvPr/>
+            </p:nvSpPr>
+            <p:spPr>
+              <a:xfrm>
+                <a:off x="6784106" y="527717"/>
+                <a:ext cx="1033754" cy="307777"/>
+              </a:xfrm>
+              <a:prstGeom prst="rect">
+                <a:avLst/>
+              </a:prstGeom>
+              <a:blipFill>
+                <a:blip r:embed="rId14"/>
+                <a:stretch>
+                  <a:fillRect/>
+                </a:stretch>
+              </a:blipFill>
+            </p:spPr>
+            <p:txBody>
+              <a:bodyPr/>
+              <a:lstStyle/>
+              <a:p>
+                <a:r>
+                  <a:rPr lang="en-US">
+                    <a:noFill/>
+                  </a:rPr>
+                  <a:t> </a:t>
+                </a:r>
+              </a:p>
+            </p:txBody>
+          </p:sp>
+        </mc:Fallback>
+      </mc:AlternateContent>
+      <mc:AlternateContent xmlns:mc="http://schemas.openxmlformats.org/markup-compatibility/2006" xmlns:a14="http://schemas.microsoft.com/office/drawing/2010/main">
+        <mc:Choice Requires="a14">
+          <p:sp>
+            <p:nvSpPr>
+              <p:cNvPr id="62" name="TextBox 61">
+                <a:extLst>
+                  <a:ext uri="{FF2B5EF4-FFF2-40B4-BE49-F238E27FC236}">
+                    <a16:creationId xmlns:a16="http://schemas.microsoft.com/office/drawing/2014/main" id="{92FA6681-FDF8-46C2-B064-AF556B250A16}"/>
+                  </a:ext>
+                </a:extLst>
+              </p:cNvPr>
+              <p:cNvSpPr txBox="1"/>
+              <p:nvPr/>
+            </p:nvSpPr>
+            <p:spPr>
+              <a:xfrm>
+                <a:off x="7548091" y="524603"/>
+                <a:ext cx="1033754" cy="307777"/>
+              </a:xfrm>
+              <a:prstGeom prst="rect">
+                <a:avLst/>
+              </a:prstGeom>
+              <a:noFill/>
+            </p:spPr>
+            <p:txBody>
+              <a:bodyPr wrap="square" rtlCol="0">
+                <a:spAutoFit/>
+              </a:bodyPr>
+              <a:lstStyle/>
+              <a:p>
+                <a:pPr/>
+                <a14:m>
+                  <m:oMathPara xmlns:m="http://schemas.openxmlformats.org/officeDocument/2006/math">
+                    <m:oMathParaPr>
+                      <m:jc m:val="centerGroup"/>
+                    </m:oMathParaPr>
+                    <m:oMath xmlns:m="http://schemas.openxmlformats.org/officeDocument/2006/math">
+                      <m:sSub>
+                        <m:sSubPr>
+                          <m:ctrlPr>
+                            <a:rPr lang="en-US" sz="1400" b="0" i="1" smtClean="0">
+                              <a:latin typeface="Cambria Math" panose="02040503050406030204" pitchFamily="18" charset="0"/>
+                            </a:rPr>
+                          </m:ctrlPr>
+                        </m:sSubPr>
+                        <m:e>
+                          <m:r>
+                            <a:rPr lang="en-US" sz="1400" b="0" i="1" smtClean="0">
+                              <a:latin typeface="Cambria Math" panose="02040503050406030204" pitchFamily="18" charset="0"/>
+                            </a:rPr>
+                            <m:t>𝑚</m:t>
+                          </m:r>
+                        </m:e>
+                        <m:sub>
+                          <m:r>
+                            <a:rPr lang="en-US" sz="1400" b="0" i="1" smtClean="0">
+                              <a:latin typeface="Cambria Math" panose="02040503050406030204" pitchFamily="18" charset="0"/>
+                            </a:rPr>
+                            <m:t>𝑎</m:t>
+                          </m:r>
+                        </m:sub>
+                      </m:sSub>
+                      <m:r>
+                        <a:rPr lang="en-US" sz="1400" b="0" i="1" smtClean="0">
+                          <a:latin typeface="Cambria Math" panose="02040503050406030204" pitchFamily="18" charset="0"/>
+                        </a:rPr>
+                        <m:t>=1</m:t>
+                      </m:r>
+                    </m:oMath>
+                  </m:oMathPara>
+                </a14:m>
+                <a:endParaRPr lang="en-US" sz="1400" dirty="0"/>
+              </a:p>
+            </p:txBody>
+          </p:sp>
+        </mc:Choice>
+        <mc:Fallback xmlns="">
+          <p:sp>
+            <p:nvSpPr>
+              <p:cNvPr id="62" name="TextBox 61">
+                <a:extLst>
+                  <a:ext uri="{FF2B5EF4-FFF2-40B4-BE49-F238E27FC236}">
+                    <a16:creationId xmlns:a16="http://schemas.microsoft.com/office/drawing/2014/main" id="{92FA6681-FDF8-46C2-B064-AF556B250A16}"/>
+                  </a:ext>
+                </a:extLst>
+              </p:cNvPr>
+              <p:cNvSpPr txBox="1">
+                <a:spLocks noRot="1" noChangeAspect="1" noMove="1" noResize="1" noEditPoints="1" noAdjustHandles="1" noChangeArrowheads="1" noChangeShapeType="1" noTextEdit="1"/>
+              </p:cNvSpPr>
+              <p:nvPr/>
+            </p:nvSpPr>
+            <p:spPr>
+              <a:xfrm>
+                <a:off x="7548091" y="524603"/>
+                <a:ext cx="1033754" cy="307777"/>
+              </a:xfrm>
+              <a:prstGeom prst="rect">
+                <a:avLst/>
+              </a:prstGeom>
+              <a:blipFill>
+                <a:blip r:embed="rId15"/>
+                <a:stretch>
+                  <a:fillRect/>
+                </a:stretch>
+              </a:blipFill>
+            </p:spPr>
+            <p:txBody>
+              <a:bodyPr/>
+              <a:lstStyle/>
+              <a:p>
+                <a:r>
+                  <a:rPr lang="en-US">
+                    <a:noFill/>
+                  </a:rPr>
+                  <a:t> </a:t>
+                </a:r>
+              </a:p>
+            </p:txBody>
+          </p:sp>
+        </mc:Fallback>
+      </mc:AlternateContent>
+      <p:sp>
+        <p:nvSpPr>
+          <p:cNvPr id="65" name="TextBox 64">
+            <a:extLst>
+              <a:ext uri="{FF2B5EF4-FFF2-40B4-BE49-F238E27FC236}">
+                <a16:creationId xmlns:a16="http://schemas.microsoft.com/office/drawing/2014/main" id="{6DBEFB95-6D10-4B46-BD99-8AE3FBCF902D}"/>
+              </a:ext>
+            </a:extLst>
+          </p:cNvPr>
+          <p:cNvSpPr txBox="1"/>
+          <p:nvPr/>
+        </p:nvSpPr>
+        <p:spPr>
+          <a:xfrm>
+            <a:off x="4088234" y="3785093"/>
+            <a:ext cx="1538862" cy="369332"/>
+          </a:xfrm>
+          <a:prstGeom prst="rect">
+            <a:avLst/>
+          </a:prstGeom>
+          <a:noFill/>
+        </p:spPr>
+        <p:txBody>
+          <a:bodyPr wrap="square" rtlCol="0">
+            <a:spAutoFit/>
+          </a:bodyPr>
+          <a:lstStyle/>
+          <a:p>
+            <a:r>
+              <a:rPr lang="en-US" dirty="0">
+                <a:latin typeface="Times New Roman" panose="02020603050405020304" pitchFamily="18" charset="0"/>
+                <a:cs typeface="Times New Roman" panose="02020603050405020304" pitchFamily="18" charset="0"/>
+              </a:rPr>
+              <a:t>Time (</a:t>
+            </a:r>
+            <a:r>
+              <a:rPr lang="en-US" dirty="0" err="1">
+                <a:latin typeface="Times New Roman" panose="02020603050405020304" pitchFamily="18" charset="0"/>
+                <a:cs typeface="Times New Roman" panose="02020603050405020304" pitchFamily="18" charset="0"/>
+              </a:rPr>
+              <a:t>ms</a:t>
+            </a:r>
+            <a:r>
+              <a:rPr lang="en-US" dirty="0">
+                <a:latin typeface="Times New Roman" panose="02020603050405020304" pitchFamily="18" charset="0"/>
+                <a:cs typeface="Times New Roman" panose="02020603050405020304" pitchFamily="18" charset="0"/>
+              </a:rPr>
+              <a:t>)</a:t>
+            </a:r>
+          </a:p>
+        </p:txBody>
+      </p:sp>
+      <p:sp>
+        <p:nvSpPr>
+          <p:cNvPr id="66" name="Right Brace 65">
+            <a:extLst>
+              <a:ext uri="{FF2B5EF4-FFF2-40B4-BE49-F238E27FC236}">
+                <a16:creationId xmlns:a16="http://schemas.microsoft.com/office/drawing/2014/main" id="{30780A59-83D5-4A33-ABD4-61468512D2F4}"/>
+              </a:ext>
+            </a:extLst>
+          </p:cNvPr>
+          <p:cNvSpPr/>
+          <p:nvPr/>
+        </p:nvSpPr>
+        <p:spPr>
+          <a:xfrm rot="16200000">
+            <a:off x="7576211" y="-276748"/>
+            <a:ext cx="195072" cy="1495485"/>
+          </a:xfrm>
+          <a:prstGeom prst="rightBrace">
+            <a:avLst>
+              <a:gd name="adj1" fmla="val 13719"/>
+              <a:gd name="adj2" fmla="val 49572"/>
+            </a:avLst>
+          </a:prstGeom>
+          <a:ln>
+            <a:solidFill>
+              <a:srgbClr val="C835D3"/>
+            </a:solidFill>
+          </a:ln>
+        </p:spPr>
+        <p:style>
+          <a:lnRef idx="1">
+            <a:schemeClr val="accent1"/>
+          </a:lnRef>
+          <a:fillRef idx="0">
+            <a:schemeClr val="accent1"/>
+          </a:fillRef>
+          <a:effectRef idx="0">
+            <a:schemeClr val="accent1"/>
+          </a:effectRef>
+          <a:fontRef idx="minor">
+            <a:schemeClr val="tx1"/>
+          </a:fontRef>
+        </p:style>
+        <p:txBody>
+          <a:bodyPr rtlCol="0" anchor="ctr"/>
+          <a:lstStyle/>
+          <a:p>
+            <a:pPr algn="ctr"/>
+            <a:endParaRPr lang="en-US"/>
+          </a:p>
+        </p:txBody>
+      </p:sp>
+      <p:sp>
+        <p:nvSpPr>
+          <p:cNvPr id="67" name="Right Brace 66">
+            <a:extLst>
+              <a:ext uri="{FF2B5EF4-FFF2-40B4-BE49-F238E27FC236}">
+                <a16:creationId xmlns:a16="http://schemas.microsoft.com/office/drawing/2014/main" id="{20E1C662-14EA-4053-95F8-070D12C8EF29}"/>
+              </a:ext>
+            </a:extLst>
+          </p:cNvPr>
+          <p:cNvSpPr/>
+          <p:nvPr/>
+        </p:nvSpPr>
+        <p:spPr>
+          <a:xfrm rot="16200000">
+            <a:off x="3896705" y="-2473533"/>
+            <a:ext cx="166408" cy="5894706"/>
+          </a:xfrm>
+          <a:prstGeom prst="rightBrace">
+            <a:avLst>
+              <a:gd name="adj1" fmla="val 13719"/>
+              <a:gd name="adj2" fmla="val 49572"/>
+            </a:avLst>
+          </a:prstGeom>
+          <a:ln>
+            <a:solidFill>
+              <a:srgbClr val="549DB4"/>
+            </a:solidFill>
+          </a:ln>
+        </p:spPr>
+        <p:style>
+          <a:lnRef idx="1">
+            <a:schemeClr val="accent1"/>
+          </a:lnRef>
+          <a:fillRef idx="0">
+            <a:schemeClr val="accent1"/>
+          </a:fillRef>
+          <a:effectRef idx="0">
+            <a:schemeClr val="accent1"/>
+          </a:effectRef>
+          <a:fontRef idx="minor">
+            <a:schemeClr val="tx1"/>
+          </a:fontRef>
+        </p:style>
+        <p:txBody>
+          <a:bodyPr rtlCol="0" anchor="ctr"/>
+          <a:lstStyle/>
+          <a:p>
+            <a:pPr algn="ctr"/>
+            <a:endParaRPr lang="en-US"/>
+          </a:p>
+        </p:txBody>
+      </p:sp>
+      <p:sp>
+        <p:nvSpPr>
+          <p:cNvPr id="68" name="TextBox 67">
+            <a:extLst>
+              <a:ext uri="{FF2B5EF4-FFF2-40B4-BE49-F238E27FC236}">
+                <a16:creationId xmlns:a16="http://schemas.microsoft.com/office/drawing/2014/main" id="{56A16DEA-A187-4876-8570-A9C2267BE232}"/>
+              </a:ext>
+            </a:extLst>
+          </p:cNvPr>
+          <p:cNvSpPr txBox="1"/>
+          <p:nvPr/>
+        </p:nvSpPr>
+        <p:spPr>
+          <a:xfrm>
+            <a:off x="2941013" y="2929"/>
+            <a:ext cx="2116914" cy="369332"/>
+          </a:xfrm>
+          <a:prstGeom prst="rect">
+            <a:avLst/>
+          </a:prstGeom>
+          <a:noFill/>
+        </p:spPr>
+        <p:txBody>
+          <a:bodyPr wrap="square" rtlCol="0">
+            <a:spAutoFit/>
+          </a:bodyPr>
+          <a:lstStyle/>
+          <a:p>
+            <a:r>
+              <a:rPr lang="en-US" dirty="0">
+                <a:solidFill>
+                  <a:srgbClr val="549DB4"/>
+                </a:solidFill>
+                <a:latin typeface="Times New Roman" panose="02020603050405020304" pitchFamily="18" charset="0"/>
+                <a:cs typeface="Times New Roman" panose="02020603050405020304" pitchFamily="18" charset="0"/>
+              </a:rPr>
+              <a:t>Controllable Region</a:t>
+            </a:r>
+          </a:p>
+        </p:txBody>
+      </p:sp>
+      <p:sp>
+        <p:nvSpPr>
+          <p:cNvPr id="70" name="TextBox 69">
+            <a:extLst>
+              <a:ext uri="{FF2B5EF4-FFF2-40B4-BE49-F238E27FC236}">
+                <a16:creationId xmlns:a16="http://schemas.microsoft.com/office/drawing/2014/main" id="{20D65DB2-0ADF-4F94-831D-827E73432D2B}"/>
+              </a:ext>
+            </a:extLst>
+          </p:cNvPr>
+          <p:cNvSpPr txBox="1"/>
+          <p:nvPr/>
+        </p:nvSpPr>
+        <p:spPr>
+          <a:xfrm>
+            <a:off x="6221549" y="7702"/>
+            <a:ext cx="2398607" cy="369332"/>
+          </a:xfrm>
+          <a:prstGeom prst="rect">
+            <a:avLst/>
+          </a:prstGeom>
+          <a:noFill/>
+        </p:spPr>
+        <p:txBody>
+          <a:bodyPr wrap="square" rtlCol="0">
+            <a:spAutoFit/>
+          </a:bodyPr>
+          <a:lstStyle/>
+          <a:p>
+            <a:r>
+              <a:rPr lang="en-US" dirty="0">
+                <a:solidFill>
+                  <a:srgbClr val="C835D3"/>
+                </a:solidFill>
+                <a:latin typeface="Times New Roman" panose="02020603050405020304" pitchFamily="18" charset="0"/>
+                <a:cs typeface="Times New Roman" panose="02020603050405020304" pitchFamily="18" charset="0"/>
+              </a:rPr>
+              <a:t>Uncontrollable Region</a:t>
+            </a:r>
+          </a:p>
+        </p:txBody>
+      </p:sp>
+      <p:cxnSp>
+        <p:nvCxnSpPr>
+          <p:cNvPr id="71" name="Straight Connector 70">
+            <a:extLst>
+              <a:ext uri="{FF2B5EF4-FFF2-40B4-BE49-F238E27FC236}">
+                <a16:creationId xmlns:a16="http://schemas.microsoft.com/office/drawing/2014/main" id="{55E8DE7C-3AAB-4E85-8AB8-9BE41618E658}"/>
+              </a:ext>
+            </a:extLst>
+          </p:cNvPr>
+          <p:cNvCxnSpPr>
+            <a:cxnSpLocks/>
+          </p:cNvCxnSpPr>
+          <p:nvPr/>
+        </p:nvCxnSpPr>
+        <p:spPr>
+          <a:xfrm>
+            <a:off x="4708382" y="606512"/>
+            <a:ext cx="4300" cy="2923219"/>
+          </a:xfrm>
+          <a:prstGeom prst="line">
+            <a:avLst/>
+          </a:prstGeom>
+          <a:ln w="19050">
+            <a:solidFill>
+              <a:schemeClr val="tx1"/>
+            </a:solidFill>
+            <a:prstDash val="sysDot"/>
+          </a:ln>
+          <a:effectLst>
+            <a:glow rad="25400">
+              <a:schemeClr val="bg1"/>
+            </a:glow>
+          </a:effectLst>
+        </p:spPr>
+        <p:style>
+          <a:lnRef idx="1">
+            <a:schemeClr val="accent1"/>
+          </a:lnRef>
+          <a:fillRef idx="0">
+            <a:schemeClr val="accent1"/>
+          </a:fillRef>
+          <a:effectRef idx="0">
+            <a:schemeClr val="accent1"/>
+          </a:effectRef>
+          <a:fontRef idx="minor">
+            <a:schemeClr val="tx1"/>
+          </a:fontRef>
+        </p:style>
+      </p:cxnSp>
+      <p:cxnSp>
+        <p:nvCxnSpPr>
+          <p:cNvPr id="82" name="Straight Connector 81">
+            <a:extLst>
+              <a:ext uri="{FF2B5EF4-FFF2-40B4-BE49-F238E27FC236}">
+                <a16:creationId xmlns:a16="http://schemas.microsoft.com/office/drawing/2014/main" id="{6BF10DEA-CA8F-4E63-A10F-5BF7A0F3E24E}"/>
+              </a:ext>
+            </a:extLst>
+          </p:cNvPr>
+          <p:cNvCxnSpPr>
+            <a:cxnSpLocks/>
+          </p:cNvCxnSpPr>
+          <p:nvPr/>
+        </p:nvCxnSpPr>
+        <p:spPr>
+          <a:xfrm>
+            <a:off x="2492273" y="3492500"/>
+            <a:ext cx="0" cy="661925"/>
+          </a:xfrm>
+          <a:prstGeom prst="line">
+            <a:avLst/>
+          </a:prstGeom>
+          <a:ln w="12700">
+            <a:solidFill>
+              <a:schemeClr val="bg1"/>
+            </a:solidFill>
+            <a:prstDash val="sysDot"/>
+            <a:tailEnd type="triangle"/>
+          </a:ln>
+          <a:effectLst>
+            <a:glow rad="25400">
+              <a:srgbClr val="FF0000">
+                <a:alpha val="75000"/>
+              </a:srgbClr>
+            </a:glow>
+          </a:effectLst>
+        </p:spPr>
+        <p:style>
+          <a:lnRef idx="1">
+            <a:schemeClr val="accent1"/>
+          </a:lnRef>
+          <a:fillRef idx="0">
+            <a:schemeClr val="accent1"/>
+          </a:fillRef>
+          <a:effectRef idx="0">
+            <a:schemeClr val="accent1"/>
+          </a:effectRef>
+          <a:fontRef idx="minor">
+            <a:schemeClr val="tx1"/>
+          </a:fontRef>
+        </p:style>
+      </p:cxnSp>
+      <p:cxnSp>
+        <p:nvCxnSpPr>
+          <p:cNvPr id="64" name="Straight Connector 63">
+            <a:extLst>
+              <a:ext uri="{FF2B5EF4-FFF2-40B4-BE49-F238E27FC236}">
+                <a16:creationId xmlns:a16="http://schemas.microsoft.com/office/drawing/2014/main" id="{C2687BE5-2806-419F-842E-0310482AC7C3}"/>
+              </a:ext>
+            </a:extLst>
+          </p:cNvPr>
+          <p:cNvCxnSpPr>
+            <a:cxnSpLocks/>
+          </p:cNvCxnSpPr>
+          <p:nvPr/>
+        </p:nvCxnSpPr>
+        <p:spPr>
+          <a:xfrm>
+            <a:off x="6705556" y="3492500"/>
+            <a:ext cx="0" cy="661925"/>
+          </a:xfrm>
+          <a:prstGeom prst="line">
+            <a:avLst/>
+          </a:prstGeom>
+          <a:ln w="12700">
+            <a:solidFill>
+              <a:schemeClr val="bg1"/>
+            </a:solidFill>
+            <a:prstDash val="sysDot"/>
+            <a:tailEnd type="triangle"/>
+          </a:ln>
+          <a:effectLst>
+            <a:glow rad="25400">
+              <a:srgbClr val="FF0000">
+                <a:alpha val="75000"/>
+              </a:srgbClr>
+            </a:glow>
+          </a:effectLst>
+        </p:spPr>
+        <p:style>
+          <a:lnRef idx="1">
+            <a:schemeClr val="accent1"/>
+          </a:lnRef>
+          <a:fillRef idx="0">
+            <a:schemeClr val="accent1"/>
+          </a:fillRef>
+          <a:effectRef idx="0">
+            <a:schemeClr val="accent1"/>
+          </a:effectRef>
+          <a:fontRef idx="minor">
+            <a:schemeClr val="tx1"/>
+          </a:fontRef>
+        </p:style>
+      </p:cxnSp>
+      <p:pic>
+        <p:nvPicPr>
+          <p:cNvPr id="34" name="Picture 33">
+            <a:extLst>
+              <a:ext uri="{FF2B5EF4-FFF2-40B4-BE49-F238E27FC236}">
+                <a16:creationId xmlns:a16="http://schemas.microsoft.com/office/drawing/2014/main" id="{2FF26F18-40E9-48F9-9867-146DD92A4F3D}"/>
+              </a:ext>
+            </a:extLst>
+          </p:cNvPr>
+          <p:cNvPicPr>
+            <a:picLocks noChangeAspect="1"/>
+          </p:cNvPicPr>
+          <p:nvPr/>
+        </p:nvPicPr>
+        <p:blipFill>
+          <a:blip r:embed="rId16"/>
+          <a:stretch>
+            <a:fillRect/>
+          </a:stretch>
+        </p:blipFill>
+        <p:spPr>
+          <a:xfrm>
+            <a:off x="4810156" y="4146010"/>
+            <a:ext cx="3810000" cy="1905000"/>
+          </a:xfrm>
+          <a:prstGeom prst="rect">
+            <a:avLst/>
+          </a:prstGeom>
+        </p:spPr>
+      </p:pic>
+      <p:pic>
+        <p:nvPicPr>
+          <p:cNvPr id="37" name="Picture 36">
+            <a:extLst>
+              <a:ext uri="{FF2B5EF4-FFF2-40B4-BE49-F238E27FC236}">
+                <a16:creationId xmlns:a16="http://schemas.microsoft.com/office/drawing/2014/main" id="{7009BE86-DA86-45D9-988D-F0CBF4EE29EC}"/>
+              </a:ext>
+            </a:extLst>
+          </p:cNvPr>
+          <p:cNvPicPr>
+            <a:picLocks noChangeAspect="1"/>
+          </p:cNvPicPr>
+          <p:nvPr/>
+        </p:nvPicPr>
+        <p:blipFill>
+          <a:blip r:embed="rId17"/>
+          <a:stretch>
+            <a:fillRect/>
+          </a:stretch>
+        </p:blipFill>
+        <p:spPr>
+          <a:xfrm>
+            <a:off x="630278" y="4146010"/>
+            <a:ext cx="3810000" cy="1905000"/>
+          </a:xfrm>
+          <a:prstGeom prst="rect">
+            <a:avLst/>
+          </a:prstGeom>
+        </p:spPr>
+      </p:pic>
+      <mc:AlternateContent xmlns:mc="http://schemas.openxmlformats.org/markup-compatibility/2006">
+        <mc:Choice xmlns:a14="http://schemas.microsoft.com/office/drawing/2010/main" Requires="a14">
+          <p:sp>
+            <p:nvSpPr>
+              <p:cNvPr id="63" name="TextBox 62">
+                <a:extLst>
+                  <a:ext uri="{FF2B5EF4-FFF2-40B4-BE49-F238E27FC236}">
+                    <a16:creationId xmlns:a16="http://schemas.microsoft.com/office/drawing/2014/main" id="{4C9CF446-2D62-431D-BF44-0271D76F2C69}"/>
+                  </a:ext>
+                </a:extLst>
+              </p:cNvPr>
+              <p:cNvSpPr txBox="1"/>
+              <p:nvPr/>
+            </p:nvSpPr>
+            <p:spPr>
+              <a:xfrm rot="16200000">
+                <a:off x="-198167" y="4825624"/>
+                <a:ext cx="1637198" cy="434478"/>
+              </a:xfrm>
+              <a:prstGeom prst="rect">
+                <a:avLst/>
+              </a:prstGeom>
+              <a:noFill/>
+            </p:spPr>
+            <p:txBody>
+              <a:bodyPr wrap="square" rtlCol="0">
+                <a:spAutoFit/>
+              </a:bodyPr>
+              <a:lstStyle/>
+              <a:p>
+                <a14:m>
+                  <m:oMath xmlns:m="http://schemas.openxmlformats.org/officeDocument/2006/math">
+                    <m:sSub>
+                      <m:sSubPr>
+                        <m:ctrlPr>
+                          <a:rPr lang="en-US" b="0" i="1" smtClean="0">
+                            <a:latin typeface="Cambria Math" panose="02040503050406030204" pitchFamily="18" charset="0"/>
+                            <a:cs typeface="Times New Roman" panose="02020603050405020304" pitchFamily="18" charset="0"/>
+                          </a:rPr>
+                        </m:ctrlPr>
+                      </m:sSubPr>
+                      <m:e>
+                        <m:r>
+                          <a:rPr lang="en-US" b="0" i="1" smtClean="0">
+                            <a:latin typeface="Cambria Math" panose="02040503050406030204" pitchFamily="18" charset="0"/>
+                            <a:cs typeface="Times New Roman" panose="02020603050405020304" pitchFamily="18" charset="0"/>
+                          </a:rPr>
+                          <m:t>𝑈</m:t>
+                        </m:r>
+                      </m:e>
+                      <m:sub>
+                        <m:r>
+                          <a:rPr lang="en-US" b="0" i="1" smtClean="0">
+                            <a:latin typeface="Cambria Math" panose="02040503050406030204" pitchFamily="18" charset="0"/>
+                            <a:cs typeface="Times New Roman" panose="02020603050405020304" pitchFamily="18" charset="0"/>
+                          </a:rPr>
+                          <m:t>𝑖</m:t>
+                        </m:r>
+                      </m:sub>
+                    </m:sSub>
+                    <m:r>
+                      <a:rPr lang="en-US" b="0" i="1" smtClean="0">
+                        <a:latin typeface="Cambria Math" panose="02040503050406030204" pitchFamily="18" charset="0"/>
+                        <a:cs typeface="Times New Roman" panose="02020603050405020304" pitchFamily="18" charset="0"/>
+                      </a:rPr>
+                      <m:t> / </m:t>
+                    </m:r>
+                    <m:sSubSup>
+                      <m:sSubSupPr>
+                        <m:ctrlPr>
+                          <a:rPr lang="en-US" b="0" i="1" smtClean="0">
+                            <a:latin typeface="Cambria Math" panose="02040503050406030204" pitchFamily="18" charset="0"/>
+                            <a:cs typeface="Times New Roman" panose="02020603050405020304" pitchFamily="18" charset="0"/>
+                          </a:rPr>
+                        </m:ctrlPr>
+                      </m:sSubSupPr>
+                      <m:e>
+                        <m:r>
+                          <a:rPr lang="en-US" b="0" i="1" smtClean="0">
+                            <a:latin typeface="Cambria Math" panose="02040503050406030204" pitchFamily="18" charset="0"/>
+                            <a:cs typeface="Times New Roman" panose="02020603050405020304" pitchFamily="18" charset="0"/>
+                          </a:rPr>
+                          <m:t>𝑈</m:t>
+                        </m:r>
+                      </m:e>
+                      <m:sub>
+                        <m:r>
+                          <a:rPr lang="en-US" b="0" i="1" smtClean="0">
+                            <a:latin typeface="Cambria Math" panose="02040503050406030204" pitchFamily="18" charset="0"/>
+                            <a:cs typeface="Times New Roman" panose="02020603050405020304" pitchFamily="18" charset="0"/>
+                          </a:rPr>
+                          <m:t>𝑖</m:t>
+                        </m:r>
+                      </m:sub>
+                      <m:sup>
+                        <m:r>
+                          <a:rPr lang="en-US" b="0" i="1" smtClean="0">
+                            <a:latin typeface="Cambria Math" panose="02040503050406030204" pitchFamily="18" charset="0"/>
+                            <a:cs typeface="Times New Roman" panose="02020603050405020304" pitchFamily="18" charset="0"/>
+                          </a:rPr>
+                          <m:t>𝑓</m:t>
+                        </m:r>
+                      </m:sup>
+                    </m:sSubSup>
+                    <m:r>
+                      <a:rPr lang="en-US" b="0" i="1" smtClean="0">
+                        <a:latin typeface="Cambria Math" panose="02040503050406030204" pitchFamily="18" charset="0"/>
+                        <a:cs typeface="Times New Roman" panose="02020603050405020304" pitchFamily="18" charset="0"/>
+                      </a:rPr>
+                      <m:t> </m:t>
+                    </m:r>
+                  </m:oMath>
+                </a14:m>
+                <a:r>
+                  <a:rPr lang="en-US" dirty="0">
+                    <a:latin typeface="Times New Roman" panose="02020603050405020304" pitchFamily="18" charset="0"/>
+                    <a:cs typeface="Times New Roman" panose="02020603050405020304" pitchFamily="18" charset="0"/>
+                  </a:rPr>
+                  <a:t>(</a:t>
+                </a:r>
+                <a:r>
+                  <a:rPr lang="en-US" dirty="0" err="1">
+                    <a:latin typeface="Times New Roman" panose="02020603050405020304" pitchFamily="18" charset="0"/>
+                    <a:cs typeface="Times New Roman" panose="02020603050405020304" pitchFamily="18" charset="0"/>
+                  </a:rPr>
+                  <a:t>p.u</a:t>
+                </a:r>
+                <a:r>
+                  <a:rPr lang="en-US" dirty="0">
+                    <a:latin typeface="Times New Roman" panose="02020603050405020304" pitchFamily="18" charset="0"/>
+                    <a:cs typeface="Times New Roman" panose="02020603050405020304" pitchFamily="18" charset="0"/>
+                  </a:rPr>
+                  <a:t>)</a:t>
+                </a:r>
+              </a:p>
+            </p:txBody>
+          </p:sp>
+        </mc:Choice>
+        <mc:Fallback>
+          <p:sp>
+            <p:nvSpPr>
+              <p:cNvPr id="63" name="TextBox 62">
+                <a:extLst>
+                  <a:ext uri="{FF2B5EF4-FFF2-40B4-BE49-F238E27FC236}">
+                    <a16:creationId xmlns:a16="http://schemas.microsoft.com/office/drawing/2014/main" id="{4C9CF446-2D62-431D-BF44-0271D76F2C69}"/>
+                  </a:ext>
+                </a:extLst>
+              </p:cNvPr>
+              <p:cNvSpPr txBox="1">
+                <a:spLocks noRot="1" noChangeAspect="1" noMove="1" noResize="1" noEditPoints="1" noAdjustHandles="1" noChangeArrowheads="1" noChangeShapeType="1" noTextEdit="1"/>
+              </p:cNvSpPr>
+              <p:nvPr/>
+            </p:nvSpPr>
+            <p:spPr>
+              <a:xfrm rot="16200000">
+                <a:off x="-198167" y="4825624"/>
+                <a:ext cx="1637198" cy="434478"/>
+              </a:xfrm>
+              <a:prstGeom prst="rect">
+                <a:avLst/>
+              </a:prstGeom>
+              <a:blipFill>
+                <a:blip r:embed="rId18"/>
+                <a:stretch>
+                  <a:fillRect r="-18310"/>
+                </a:stretch>
+              </a:blipFill>
+            </p:spPr>
+            <p:txBody>
+              <a:bodyPr/>
+              <a:lstStyle/>
+              <a:p>
+                <a:r>
+                  <a:rPr lang="en-US">
+                    <a:noFill/>
+                  </a:rPr>
+                  <a:t> </a:t>
+                </a:r>
+              </a:p>
+            </p:txBody>
+          </p:sp>
+        </mc:Fallback>
+      </mc:AlternateContent>
+      <mc:AlternateContent xmlns:mc="http://schemas.openxmlformats.org/markup-compatibility/2006">
+        <mc:Choice xmlns:a14="http://schemas.microsoft.com/office/drawing/2010/main" Requires="a14">
+          <p:sp>
+            <p:nvSpPr>
+              <p:cNvPr id="69" name="TextBox 68">
+                <a:extLst>
+                  <a:ext uri="{FF2B5EF4-FFF2-40B4-BE49-F238E27FC236}">
+                    <a16:creationId xmlns:a16="http://schemas.microsoft.com/office/drawing/2014/main" id="{5D86C4E8-A34A-43AC-88EF-33E7C05D87A0}"/>
+                  </a:ext>
+                </a:extLst>
+              </p:cNvPr>
+              <p:cNvSpPr txBox="1"/>
+              <p:nvPr/>
+            </p:nvSpPr>
+            <p:spPr>
+              <a:xfrm rot="16200000">
+                <a:off x="3936209" y="4825624"/>
+                <a:ext cx="1637198" cy="434478"/>
+              </a:xfrm>
+              <a:prstGeom prst="rect">
+                <a:avLst/>
+              </a:prstGeom>
+              <a:noFill/>
+            </p:spPr>
+            <p:txBody>
+              <a:bodyPr wrap="square" rtlCol="0">
+                <a:spAutoFit/>
+              </a:bodyPr>
+              <a:lstStyle/>
+              <a:p>
+                <a14:m>
+                  <m:oMath xmlns:m="http://schemas.openxmlformats.org/officeDocument/2006/math">
+                    <m:sSub>
+                      <m:sSubPr>
+                        <m:ctrlPr>
+                          <a:rPr lang="en-US" b="0" i="1" smtClean="0">
+                            <a:latin typeface="Cambria Math" panose="02040503050406030204" pitchFamily="18" charset="0"/>
+                            <a:cs typeface="Times New Roman" panose="02020603050405020304" pitchFamily="18" charset="0"/>
+                          </a:rPr>
+                        </m:ctrlPr>
+                      </m:sSubPr>
+                      <m:e>
+                        <m:r>
+                          <a:rPr lang="en-US" b="0" i="1" smtClean="0">
+                            <a:latin typeface="Cambria Math" panose="02040503050406030204" pitchFamily="18" charset="0"/>
+                            <a:cs typeface="Times New Roman" panose="02020603050405020304" pitchFamily="18" charset="0"/>
+                          </a:rPr>
+                          <m:t>𝑈</m:t>
+                        </m:r>
+                      </m:e>
+                      <m:sub>
+                        <m:r>
+                          <a:rPr lang="en-US" b="0" i="1" smtClean="0">
+                            <a:latin typeface="Cambria Math" panose="02040503050406030204" pitchFamily="18" charset="0"/>
+                            <a:cs typeface="Times New Roman" panose="02020603050405020304" pitchFamily="18" charset="0"/>
+                          </a:rPr>
+                          <m:t>𝑖</m:t>
+                        </m:r>
+                      </m:sub>
+                    </m:sSub>
+                    <m:r>
+                      <a:rPr lang="en-US" b="0" i="1" smtClean="0">
+                        <a:latin typeface="Cambria Math" panose="02040503050406030204" pitchFamily="18" charset="0"/>
+                        <a:cs typeface="Times New Roman" panose="02020603050405020304" pitchFamily="18" charset="0"/>
+                      </a:rPr>
+                      <m:t> / </m:t>
+                    </m:r>
+                    <m:sSubSup>
+                      <m:sSubSupPr>
+                        <m:ctrlPr>
+                          <a:rPr lang="en-US" b="0" i="1" smtClean="0">
+                            <a:latin typeface="Cambria Math" panose="02040503050406030204" pitchFamily="18" charset="0"/>
+                            <a:cs typeface="Times New Roman" panose="02020603050405020304" pitchFamily="18" charset="0"/>
+                          </a:rPr>
+                        </m:ctrlPr>
+                      </m:sSubSupPr>
+                      <m:e>
+                        <m:r>
+                          <a:rPr lang="en-US" b="0" i="1" smtClean="0">
+                            <a:latin typeface="Cambria Math" panose="02040503050406030204" pitchFamily="18" charset="0"/>
+                            <a:cs typeface="Times New Roman" panose="02020603050405020304" pitchFamily="18" charset="0"/>
+                          </a:rPr>
+                          <m:t>𝑈</m:t>
+                        </m:r>
+                      </m:e>
+                      <m:sub>
+                        <m:r>
+                          <a:rPr lang="en-US" b="0" i="1" smtClean="0">
+                            <a:latin typeface="Cambria Math" panose="02040503050406030204" pitchFamily="18" charset="0"/>
+                            <a:cs typeface="Times New Roman" panose="02020603050405020304" pitchFamily="18" charset="0"/>
+                          </a:rPr>
+                          <m:t>𝑖</m:t>
+                        </m:r>
+                      </m:sub>
+                      <m:sup>
+                        <m:r>
+                          <a:rPr lang="en-US" b="0" i="1" smtClean="0">
+                            <a:latin typeface="Cambria Math" panose="02040503050406030204" pitchFamily="18" charset="0"/>
+                            <a:cs typeface="Times New Roman" panose="02020603050405020304" pitchFamily="18" charset="0"/>
+                          </a:rPr>
+                          <m:t>𝑓</m:t>
+                        </m:r>
+                      </m:sup>
+                    </m:sSubSup>
+                    <m:r>
+                      <a:rPr lang="en-US" b="0" i="1" smtClean="0">
+                        <a:latin typeface="Cambria Math" panose="02040503050406030204" pitchFamily="18" charset="0"/>
+                        <a:cs typeface="Times New Roman" panose="02020603050405020304" pitchFamily="18" charset="0"/>
+                      </a:rPr>
+                      <m:t> </m:t>
+                    </m:r>
+                  </m:oMath>
+                </a14:m>
+                <a:r>
+                  <a:rPr lang="en-US" dirty="0">
+                    <a:latin typeface="Times New Roman" panose="02020603050405020304" pitchFamily="18" charset="0"/>
+                    <a:cs typeface="Times New Roman" panose="02020603050405020304" pitchFamily="18" charset="0"/>
+                  </a:rPr>
+                  <a:t>(</a:t>
+                </a:r>
+                <a:r>
+                  <a:rPr lang="en-US" dirty="0" err="1">
+                    <a:latin typeface="Times New Roman" panose="02020603050405020304" pitchFamily="18" charset="0"/>
+                    <a:cs typeface="Times New Roman" panose="02020603050405020304" pitchFamily="18" charset="0"/>
+                  </a:rPr>
+                  <a:t>p.u</a:t>
+                </a:r>
+                <a:r>
+                  <a:rPr lang="en-US" dirty="0">
+                    <a:latin typeface="Times New Roman" panose="02020603050405020304" pitchFamily="18" charset="0"/>
+                    <a:cs typeface="Times New Roman" panose="02020603050405020304" pitchFamily="18" charset="0"/>
+                  </a:rPr>
+                  <a:t>)</a:t>
+                </a:r>
+              </a:p>
+            </p:txBody>
+          </p:sp>
+        </mc:Choice>
+        <mc:Fallback>
+          <p:sp>
+            <p:nvSpPr>
+              <p:cNvPr id="69" name="TextBox 68">
+                <a:extLst>
+                  <a:ext uri="{FF2B5EF4-FFF2-40B4-BE49-F238E27FC236}">
+                    <a16:creationId xmlns:a16="http://schemas.microsoft.com/office/drawing/2014/main" id="{5D86C4E8-A34A-43AC-88EF-33E7C05D87A0}"/>
+                  </a:ext>
+                </a:extLst>
+              </p:cNvPr>
+              <p:cNvSpPr txBox="1">
+                <a:spLocks noRot="1" noChangeAspect="1" noMove="1" noResize="1" noEditPoints="1" noAdjustHandles="1" noChangeArrowheads="1" noChangeShapeType="1" noTextEdit="1"/>
+              </p:cNvSpPr>
+              <p:nvPr/>
+            </p:nvSpPr>
+            <p:spPr>
+              <a:xfrm rot="16200000">
+                <a:off x="3936209" y="4825624"/>
+                <a:ext cx="1637198" cy="434478"/>
+              </a:xfrm>
+              <a:prstGeom prst="rect">
+                <a:avLst/>
+              </a:prstGeom>
+              <a:blipFill>
+                <a:blip r:embed="rId19"/>
+                <a:stretch>
+                  <a:fillRect r="-16667"/>
+                </a:stretch>
+              </a:blipFill>
+            </p:spPr>
+            <p:txBody>
+              <a:bodyPr/>
+              <a:lstStyle/>
+              <a:p>
+                <a:r>
+                  <a:rPr lang="en-US">
+                    <a:noFill/>
+                  </a:rPr>
+                  <a:t> </a:t>
+                </a:r>
+              </a:p>
+            </p:txBody>
+          </p:sp>
+        </mc:Fallback>
+      </mc:AlternateContent>
+      <p:sp>
+        <p:nvSpPr>
+          <p:cNvPr id="72" name="TextBox 71">
+            <a:extLst>
+              <a:ext uri="{FF2B5EF4-FFF2-40B4-BE49-F238E27FC236}">
+                <a16:creationId xmlns:a16="http://schemas.microsoft.com/office/drawing/2014/main" id="{779CC8DB-6AD5-48EE-902A-82238952BF35}"/>
+              </a:ext>
+            </a:extLst>
+          </p:cNvPr>
+          <p:cNvSpPr txBox="1"/>
+          <p:nvPr/>
+        </p:nvSpPr>
+        <p:spPr>
+          <a:xfrm>
+            <a:off x="2049630" y="5966997"/>
+            <a:ext cx="1538862" cy="369332"/>
+          </a:xfrm>
+          <a:prstGeom prst="rect">
+            <a:avLst/>
+          </a:prstGeom>
+          <a:noFill/>
+        </p:spPr>
+        <p:txBody>
+          <a:bodyPr wrap="square" rtlCol="0">
+            <a:spAutoFit/>
+          </a:bodyPr>
+          <a:lstStyle/>
+          <a:p>
+            <a:r>
+              <a:rPr lang="en-US" dirty="0">
+                <a:latin typeface="Times New Roman" panose="02020603050405020304" pitchFamily="18" charset="0"/>
+                <a:cs typeface="Times New Roman" panose="02020603050405020304" pitchFamily="18" charset="0"/>
+              </a:rPr>
+              <a:t>Time (</a:t>
+            </a:r>
+            <a:r>
+              <a:rPr lang="en-US" dirty="0" err="1">
+                <a:latin typeface="Times New Roman" panose="02020603050405020304" pitchFamily="18" charset="0"/>
+                <a:cs typeface="Times New Roman" panose="02020603050405020304" pitchFamily="18" charset="0"/>
+              </a:rPr>
+              <a:t>ms</a:t>
+            </a:r>
+            <a:r>
+              <a:rPr lang="en-US" dirty="0">
+                <a:latin typeface="Times New Roman" panose="02020603050405020304" pitchFamily="18" charset="0"/>
+                <a:cs typeface="Times New Roman" panose="02020603050405020304" pitchFamily="18" charset="0"/>
+              </a:rPr>
+              <a:t>)</a:t>
+            </a:r>
+          </a:p>
+        </p:txBody>
+      </p:sp>
+      <p:sp>
+        <p:nvSpPr>
+          <p:cNvPr id="73" name="TextBox 72">
+            <a:extLst>
+              <a:ext uri="{FF2B5EF4-FFF2-40B4-BE49-F238E27FC236}">
+                <a16:creationId xmlns:a16="http://schemas.microsoft.com/office/drawing/2014/main" id="{97491946-8F6C-4A8D-BF53-AF56C67A131D}"/>
+              </a:ext>
+            </a:extLst>
+          </p:cNvPr>
+          <p:cNvSpPr txBox="1"/>
+          <p:nvPr/>
+        </p:nvSpPr>
+        <p:spPr>
+          <a:xfrm>
+            <a:off x="6242367" y="5974685"/>
+            <a:ext cx="1538862" cy="369332"/>
+          </a:xfrm>
+          <a:prstGeom prst="rect">
+            <a:avLst/>
+          </a:prstGeom>
+          <a:noFill/>
+        </p:spPr>
+        <p:txBody>
+          <a:bodyPr wrap="square" rtlCol="0">
+            <a:spAutoFit/>
+          </a:bodyPr>
+          <a:lstStyle/>
+          <a:p>
+            <a:r>
+              <a:rPr lang="en-US" dirty="0">
+                <a:latin typeface="Times New Roman" panose="02020603050405020304" pitchFamily="18" charset="0"/>
+                <a:cs typeface="Times New Roman" panose="02020603050405020304" pitchFamily="18" charset="0"/>
+              </a:rPr>
+              <a:t>Time (</a:t>
+            </a:r>
+            <a:r>
+              <a:rPr lang="en-US" dirty="0" err="1">
+                <a:latin typeface="Times New Roman" panose="02020603050405020304" pitchFamily="18" charset="0"/>
+                <a:cs typeface="Times New Roman" panose="02020603050405020304" pitchFamily="18" charset="0"/>
+              </a:rPr>
+              <a:t>ms</a:t>
+            </a:r>
+            <a:r>
+              <a:rPr lang="en-US" dirty="0">
+                <a:latin typeface="Times New Roman" panose="02020603050405020304" pitchFamily="18" charset="0"/>
+                <a:cs typeface="Times New Roman" panose="02020603050405020304" pitchFamily="18" charset="0"/>
+              </a:rPr>
+              <a:t>)</a:t>
+            </a:r>
+          </a:p>
+        </p:txBody>
+      </p:sp>
+    </p:spTree>
+    <p:extLst>
+      <p:ext uri="{BB962C8B-B14F-4D97-AF65-F5344CB8AC3E}">
+        <p14:creationId xmlns:p14="http://schemas.microsoft.com/office/powerpoint/2010/main" val="3900270060"/>
       </p:ext>
     </p:extLst>
   </p:cSld>

</xml_diff>